<commit_message>
Added figure titles to visualisations
</commit_message>
<xml_diff>
--- a/RFM Analysis of Results .pptx
+++ b/RFM Analysis of Results .pptx
@@ -19,7 +19,16 @@
     <p:sldId id="270" r:id="rId16"/>
     <p:sldId id="271" r:id="rId17"/>
     <p:sldId id="272" r:id="rId18"/>
-    <p:sldId id="267" r:id="rId19"/>
+    <p:sldId id="273" r:id="rId19"/>
+    <p:sldId id="274" r:id="rId20"/>
+    <p:sldId id="275" r:id="rId21"/>
+    <p:sldId id="276" r:id="rId22"/>
+    <p:sldId id="277" r:id="rId23"/>
+    <p:sldId id="278" r:id="rId24"/>
+    <p:sldId id="279" r:id="rId25"/>
+    <p:sldId id="280" r:id="rId26"/>
+    <p:sldId id="281" r:id="rId27"/>
+    <p:sldId id="267" r:id="rId28"/>
   </p:sldIdLst>
   <p:sldSz cx="12192000" cy="6858000"/>
   <p:notesSz cx="6858000" cy="9144000"/>
@@ -145,6 +154,15 @@
         </p14:section>
         <p14:section name="Improvements" id="{2DB75315-FECE-44B8-9574-D2150C63E351}">
           <p14:sldIdLst>
+            <p14:sldId id="273"/>
+            <p14:sldId id="274"/>
+            <p14:sldId id="275"/>
+            <p14:sldId id="276"/>
+            <p14:sldId id="277"/>
+            <p14:sldId id="278"/>
+            <p14:sldId id="279"/>
+            <p14:sldId id="280"/>
+            <p14:sldId id="281"/>
             <p14:sldId id="267"/>
           </p14:sldIdLst>
         </p14:section>
@@ -157,20 +175,12 @@
 </p:presentation>
 </file>
 
-<file path=ppt/revisionInfo.xml><?xml version="1.0" encoding="utf-8"?>
-<p1510:revInfo xmlns:a="http://schemas.openxmlformats.org/drawingml/2006/main" xmlns:r="http://schemas.openxmlformats.org/officeDocument/2006/relationships" xmlns:p1510="http://schemas.microsoft.com/office/powerpoint/2015/10/main">
-  <p1510:revLst>
-    <p1510:client id="{6C27825B-9435-4AE8-87A0-124E92FD3AAA}" v="7" dt="2024-02-26T18:26:31.706"/>
-  </p1510:revLst>
-</p1510:revInfo>
-</file>
-
 <file path=ppt/changesInfos/changesInfo1.xml><?xml version="1.0" encoding="utf-8"?>
 <pc:chgInfo xmlns:a="http://schemas.openxmlformats.org/drawingml/2006/main" xmlns:r="http://schemas.openxmlformats.org/officeDocument/2006/relationships" xmlns:ac="http://schemas.microsoft.com/office/drawing/2013/main/command" xmlns:pc="http://schemas.microsoft.com/office/powerpoint/2013/main/command">
   <pc:docChgLst>
     <pc:chgData name="Don Joseph" userId="01aadf7fde9797fb" providerId="LiveId" clId="{ECD254F5-8452-483E-B5C3-D5A628E50987}"/>
-    <pc:docChg chg="undo custSel addSld delSld modSld sldOrd">
-      <pc:chgData name="Don Joseph" userId="01aadf7fde9797fb" providerId="LiveId" clId="{ECD254F5-8452-483E-B5C3-D5A628E50987}" dt="2024-02-22T17:20:53.471" v="1631" actId="1076"/>
+    <pc:docChg chg="undo custSel addSld delSld modSld sldOrd modSection">
+      <pc:chgData name="Don Joseph" userId="01aadf7fde9797fb" providerId="LiveId" clId="{ECD254F5-8452-483E-B5C3-D5A628E50987}" dt="2024-03-06T12:34:07.836" v="1876" actId="20577"/>
       <pc:docMkLst>
         <pc:docMk/>
       </pc:docMkLst>
@@ -508,6 +518,293 @@
             <ac:picMk id="4" creationId="{5D1DCE3F-AE6E-9A79-D862-1E256A1F8657}"/>
           </ac:picMkLst>
         </pc:picChg>
+      </pc:sldChg>
+      <pc:sldChg chg="addSp delSp modSp add mod ord setBg">
+        <pc:chgData name="Don Joseph" userId="01aadf7fde9797fb" providerId="LiveId" clId="{ECD254F5-8452-483E-B5C3-D5A628E50987}" dt="2024-03-06T12:14:54.298" v="1641" actId="962"/>
+        <pc:sldMkLst>
+          <pc:docMk/>
+          <pc:sldMk cId="3095813648" sldId="273"/>
+        </pc:sldMkLst>
+        <pc:spChg chg="del">
+          <ac:chgData name="Don Joseph" userId="01aadf7fde9797fb" providerId="LiveId" clId="{ECD254F5-8452-483E-B5C3-D5A628E50987}" dt="2024-03-06T12:14:27.981" v="1635" actId="478"/>
+          <ac:spMkLst>
+            <pc:docMk/>
+            <pc:sldMk cId="3095813648" sldId="273"/>
+            <ac:spMk id="3" creationId="{F52D78B5-F45F-9C0A-0C97-7CBE40AC76E9}"/>
+          </ac:spMkLst>
+        </pc:spChg>
+        <pc:spChg chg="add del mod">
+          <ac:chgData name="Don Joseph" userId="01aadf7fde9797fb" providerId="LiveId" clId="{ECD254F5-8452-483E-B5C3-D5A628E50987}" dt="2024-03-06T12:14:50.227" v="1636" actId="478"/>
+          <ac:spMkLst>
+            <pc:docMk/>
+            <pc:sldMk cId="3095813648" sldId="273"/>
+            <ac:spMk id="4" creationId="{15C63DED-D398-0FFA-18E6-2A3926A49263}"/>
+          </ac:spMkLst>
+        </pc:spChg>
+        <pc:spChg chg="add">
+          <ac:chgData name="Don Joseph" userId="01aadf7fde9797fb" providerId="LiveId" clId="{ECD254F5-8452-483E-B5C3-D5A628E50987}" dt="2024-03-06T12:14:52.915" v="1639" actId="26606"/>
+          <ac:spMkLst>
+            <pc:docMk/>
+            <pc:sldMk cId="3095813648" sldId="273"/>
+            <ac:spMk id="11" creationId="{F3060C83-F051-4F0E-ABAD-AA0DFC48B218}"/>
+          </ac:spMkLst>
+        </pc:spChg>
+        <pc:spChg chg="add">
+          <ac:chgData name="Don Joseph" userId="01aadf7fde9797fb" providerId="LiveId" clId="{ECD254F5-8452-483E-B5C3-D5A628E50987}" dt="2024-03-06T12:14:52.915" v="1639" actId="26606"/>
+          <ac:spMkLst>
+            <pc:docMk/>
+            <pc:sldMk cId="3095813648" sldId="273"/>
+            <ac:spMk id="13" creationId="{83C98ABE-055B-441F-B07E-44F97F083C39}"/>
+          </ac:spMkLst>
+        </pc:spChg>
+        <pc:spChg chg="add">
+          <ac:chgData name="Don Joseph" userId="01aadf7fde9797fb" providerId="LiveId" clId="{ECD254F5-8452-483E-B5C3-D5A628E50987}" dt="2024-03-06T12:14:52.915" v="1639" actId="26606"/>
+          <ac:spMkLst>
+            <pc:docMk/>
+            <pc:sldMk cId="3095813648" sldId="273"/>
+            <ac:spMk id="15" creationId="{29FDB030-9B49-4CED-8CCD-4D99382388AC}"/>
+          </ac:spMkLst>
+        </pc:spChg>
+        <pc:spChg chg="add">
+          <ac:chgData name="Don Joseph" userId="01aadf7fde9797fb" providerId="LiveId" clId="{ECD254F5-8452-483E-B5C3-D5A628E50987}" dt="2024-03-06T12:14:52.915" v="1639" actId="26606"/>
+          <ac:spMkLst>
+            <pc:docMk/>
+            <pc:sldMk cId="3095813648" sldId="273"/>
+            <ac:spMk id="17" creationId="{3783CA14-24A1-485C-8B30-D6A5D87987AD}"/>
+          </ac:spMkLst>
+        </pc:spChg>
+        <pc:spChg chg="add">
+          <ac:chgData name="Don Joseph" userId="01aadf7fde9797fb" providerId="LiveId" clId="{ECD254F5-8452-483E-B5C3-D5A628E50987}" dt="2024-03-06T12:14:52.915" v="1639" actId="26606"/>
+          <ac:spMkLst>
+            <pc:docMk/>
+            <pc:sldMk cId="3095813648" sldId="273"/>
+            <ac:spMk id="19" creationId="{9A97C86A-04D6-40F7-AE84-31AB43E6A846}"/>
+          </ac:spMkLst>
+        </pc:spChg>
+        <pc:spChg chg="add">
+          <ac:chgData name="Don Joseph" userId="01aadf7fde9797fb" providerId="LiveId" clId="{ECD254F5-8452-483E-B5C3-D5A628E50987}" dt="2024-03-06T12:14:52.915" v="1639" actId="26606"/>
+          <ac:spMkLst>
+            <pc:docMk/>
+            <pc:sldMk cId="3095813648" sldId="273"/>
+            <ac:spMk id="21" creationId="{FF9F2414-84E8-453E-B1F3-389FDE8192D9}"/>
+          </ac:spMkLst>
+        </pc:spChg>
+        <pc:spChg chg="add">
+          <ac:chgData name="Don Joseph" userId="01aadf7fde9797fb" providerId="LiveId" clId="{ECD254F5-8452-483E-B5C3-D5A628E50987}" dt="2024-03-06T12:14:52.915" v="1639" actId="26606"/>
+          <ac:spMkLst>
+            <pc:docMk/>
+            <pc:sldMk cId="3095813648" sldId="273"/>
+            <ac:spMk id="23" creationId="{3ECA69A1-7536-43AC-85EF-C7106179F5ED}"/>
+          </ac:spMkLst>
+        </pc:spChg>
+        <pc:picChg chg="add mod">
+          <ac:chgData name="Don Joseph" userId="01aadf7fde9797fb" providerId="LiveId" clId="{ECD254F5-8452-483E-B5C3-D5A628E50987}" dt="2024-03-06T12:14:54.298" v="1641" actId="962"/>
+          <ac:picMkLst>
+            <pc:docMk/>
+            <pc:sldMk cId="3095813648" sldId="273"/>
+            <ac:picMk id="6" creationId="{D9F389EE-ED3C-6171-EB6E-D7E9DD87432D}"/>
+          </ac:picMkLst>
+        </pc:picChg>
+      </pc:sldChg>
+      <pc:sldChg chg="addSp delSp modSp add mod">
+        <pc:chgData name="Don Joseph" userId="01aadf7fde9797fb" providerId="LiveId" clId="{ECD254F5-8452-483E-B5C3-D5A628E50987}" dt="2024-03-06T12:15:08.359" v="1646" actId="1076"/>
+        <pc:sldMkLst>
+          <pc:docMk/>
+          <pc:sldMk cId="4006794026" sldId="274"/>
+        </pc:sldMkLst>
+        <pc:picChg chg="add mod">
+          <ac:chgData name="Don Joseph" userId="01aadf7fde9797fb" providerId="LiveId" clId="{ECD254F5-8452-483E-B5C3-D5A628E50987}" dt="2024-03-06T12:15:08.359" v="1646" actId="1076"/>
+          <ac:picMkLst>
+            <pc:docMk/>
+            <pc:sldMk cId="4006794026" sldId="274"/>
+            <ac:picMk id="3" creationId="{BE6B87E1-C670-8EAE-534D-51D86AFD1B41}"/>
+          </ac:picMkLst>
+        </pc:picChg>
+        <pc:picChg chg="del">
+          <ac:chgData name="Don Joseph" userId="01aadf7fde9797fb" providerId="LiveId" clId="{ECD254F5-8452-483E-B5C3-D5A628E50987}" dt="2024-03-06T12:15:00.695" v="1643" actId="478"/>
+          <ac:picMkLst>
+            <pc:docMk/>
+            <pc:sldMk cId="4006794026" sldId="274"/>
+            <ac:picMk id="6" creationId="{D9F389EE-ED3C-6171-EB6E-D7E9DD87432D}"/>
+          </ac:picMkLst>
+        </pc:picChg>
+      </pc:sldChg>
+      <pc:sldChg chg="addSp delSp modSp add mod ord">
+        <pc:chgData name="Don Joseph" userId="01aadf7fde9797fb" providerId="LiveId" clId="{ECD254F5-8452-483E-B5C3-D5A628E50987}" dt="2024-03-06T12:18:51.482" v="1671" actId="1076"/>
+        <pc:sldMkLst>
+          <pc:docMk/>
+          <pc:sldMk cId="2886869529" sldId="275"/>
+        </pc:sldMkLst>
+        <pc:spChg chg="del">
+          <ac:chgData name="Don Joseph" userId="01aadf7fde9797fb" providerId="LiveId" clId="{ECD254F5-8452-483E-B5C3-D5A628E50987}" dt="2024-03-06T12:15:19.389" v="1650" actId="478"/>
+          <ac:spMkLst>
+            <pc:docMk/>
+            <pc:sldMk cId="2886869529" sldId="275"/>
+            <ac:spMk id="3" creationId="{F52D78B5-F45F-9C0A-0C97-7CBE40AC76E9}"/>
+          </ac:spMkLst>
+        </pc:spChg>
+        <pc:spChg chg="add del mod">
+          <ac:chgData name="Don Joseph" userId="01aadf7fde9797fb" providerId="LiveId" clId="{ECD254F5-8452-483E-B5C3-D5A628E50987}" dt="2024-03-06T12:15:23.768" v="1651" actId="478"/>
+          <ac:spMkLst>
+            <pc:docMk/>
+            <pc:sldMk cId="2886869529" sldId="275"/>
+            <ac:spMk id="4" creationId="{2D46C7B2-CC1A-310A-25D0-C9A324226EDE}"/>
+          </ac:spMkLst>
+        </pc:spChg>
+        <pc:picChg chg="add del mod">
+          <ac:chgData name="Don Joseph" userId="01aadf7fde9797fb" providerId="LiveId" clId="{ECD254F5-8452-483E-B5C3-D5A628E50987}" dt="2024-03-06T12:18:48.785" v="1668" actId="478"/>
+          <ac:picMkLst>
+            <pc:docMk/>
+            <pc:sldMk cId="2886869529" sldId="275"/>
+            <ac:picMk id="6" creationId="{D9A83582-3763-32C2-55A5-C11640595F6C}"/>
+          </ac:picMkLst>
+        </pc:picChg>
+        <pc:picChg chg="add mod">
+          <ac:chgData name="Don Joseph" userId="01aadf7fde9797fb" providerId="LiveId" clId="{ECD254F5-8452-483E-B5C3-D5A628E50987}" dt="2024-03-06T12:18:51.482" v="1671" actId="1076"/>
+          <ac:picMkLst>
+            <pc:docMk/>
+            <pc:sldMk cId="2886869529" sldId="275"/>
+            <ac:picMk id="8" creationId="{887A10ED-1605-36A0-0958-AD864D4D2626}"/>
+          </ac:picMkLst>
+        </pc:picChg>
+      </pc:sldChg>
+      <pc:sldChg chg="addSp delSp modSp add mod">
+        <pc:chgData name="Don Joseph" userId="01aadf7fde9797fb" providerId="LiveId" clId="{ECD254F5-8452-483E-B5C3-D5A628E50987}" dt="2024-03-06T12:19:56.797" v="1679" actId="1076"/>
+        <pc:sldMkLst>
+          <pc:docMk/>
+          <pc:sldMk cId="2969038079" sldId="276"/>
+        </pc:sldMkLst>
+        <pc:picChg chg="add del mod">
+          <ac:chgData name="Don Joseph" userId="01aadf7fde9797fb" providerId="LiveId" clId="{ECD254F5-8452-483E-B5C3-D5A628E50987}" dt="2024-03-06T12:19:52.509" v="1676" actId="478"/>
+          <ac:picMkLst>
+            <pc:docMk/>
+            <pc:sldMk cId="2969038079" sldId="276"/>
+            <ac:picMk id="3" creationId="{3D0ABC8A-131A-FF5A-1222-6A9605191B02}"/>
+          </ac:picMkLst>
+        </pc:picChg>
+        <pc:picChg chg="add mod">
+          <ac:chgData name="Don Joseph" userId="01aadf7fde9797fb" providerId="LiveId" clId="{ECD254F5-8452-483E-B5C3-D5A628E50987}" dt="2024-03-06T12:19:56.797" v="1679" actId="1076"/>
+          <ac:picMkLst>
+            <pc:docMk/>
+            <pc:sldMk cId="2969038079" sldId="276"/>
+            <ac:picMk id="5" creationId="{73A0446B-4FA2-AB90-30F1-5661584EF504}"/>
+          </ac:picMkLst>
+        </pc:picChg>
+        <pc:picChg chg="del">
+          <ac:chgData name="Don Joseph" userId="01aadf7fde9797fb" providerId="LiveId" clId="{ECD254F5-8452-483E-B5C3-D5A628E50987}" dt="2024-03-06T12:19:20.240" v="1672" actId="478"/>
+          <ac:picMkLst>
+            <pc:docMk/>
+            <pc:sldMk cId="2969038079" sldId="276"/>
+            <ac:picMk id="6" creationId="{D9A83582-3763-32C2-55A5-C11640595F6C}"/>
+          </ac:picMkLst>
+        </pc:picChg>
+      </pc:sldChg>
+      <pc:sldChg chg="addSp delSp add mod">
+        <pc:chgData name="Don Joseph" userId="01aadf7fde9797fb" providerId="LiveId" clId="{ECD254F5-8452-483E-B5C3-D5A628E50987}" dt="2024-03-06T12:22:04.645" v="1681" actId="22"/>
+        <pc:sldMkLst>
+          <pc:docMk/>
+          <pc:sldMk cId="3109579215" sldId="277"/>
+        </pc:sldMkLst>
+        <pc:picChg chg="add del">
+          <ac:chgData name="Don Joseph" userId="01aadf7fde9797fb" providerId="LiveId" clId="{ECD254F5-8452-483E-B5C3-D5A628E50987}" dt="2024-03-06T12:22:02.331" v="1680" actId="478"/>
+          <ac:picMkLst>
+            <pc:docMk/>
+            <pc:sldMk cId="3109579215" sldId="277"/>
+            <ac:picMk id="3" creationId="{AE693546-263B-2F4A-6A4F-6A5697A453D8}"/>
+          </ac:picMkLst>
+        </pc:picChg>
+        <pc:picChg chg="add">
+          <ac:chgData name="Don Joseph" userId="01aadf7fde9797fb" providerId="LiveId" clId="{ECD254F5-8452-483E-B5C3-D5A628E50987}" dt="2024-03-06T12:22:04.645" v="1681" actId="22"/>
+          <ac:picMkLst>
+            <pc:docMk/>
+            <pc:sldMk cId="3109579215" sldId="277"/>
+            <ac:picMk id="5" creationId="{10E51C2B-DAE0-7D83-4586-70467B6F6726}"/>
+          </ac:picMkLst>
+        </pc:picChg>
+        <pc:picChg chg="del">
+          <ac:chgData name="Don Joseph" userId="01aadf7fde9797fb" providerId="LiveId" clId="{ECD254F5-8452-483E-B5C3-D5A628E50987}" dt="2024-03-06T12:17:43.605" v="1657" actId="478"/>
+          <ac:picMkLst>
+            <pc:docMk/>
+            <pc:sldMk cId="3109579215" sldId="277"/>
+            <ac:picMk id="6" creationId="{D9A83582-3763-32C2-55A5-C11640595F6C}"/>
+          </ac:picMkLst>
+        </pc:picChg>
+      </pc:sldChg>
+      <pc:sldChg chg="addSp delSp add mod">
+        <pc:chgData name="Don Joseph" userId="01aadf7fde9797fb" providerId="LiveId" clId="{ECD254F5-8452-483E-B5C3-D5A628E50987}" dt="2024-03-06T12:17:53.771" v="1661" actId="22"/>
+        <pc:sldMkLst>
+          <pc:docMk/>
+          <pc:sldMk cId="4142997562" sldId="278"/>
+        </pc:sldMkLst>
+        <pc:picChg chg="del">
+          <ac:chgData name="Don Joseph" userId="01aadf7fde9797fb" providerId="LiveId" clId="{ECD254F5-8452-483E-B5C3-D5A628E50987}" dt="2024-03-06T12:17:50.471" v="1660" actId="478"/>
+          <ac:picMkLst>
+            <pc:docMk/>
+            <pc:sldMk cId="4142997562" sldId="278"/>
+            <ac:picMk id="3" creationId="{AE693546-263B-2F4A-6A4F-6A5697A453D8}"/>
+          </ac:picMkLst>
+        </pc:picChg>
+        <pc:picChg chg="add">
+          <ac:chgData name="Don Joseph" userId="01aadf7fde9797fb" providerId="LiveId" clId="{ECD254F5-8452-483E-B5C3-D5A628E50987}" dt="2024-03-06T12:17:53.771" v="1661" actId="22"/>
+          <ac:picMkLst>
+            <pc:docMk/>
+            <pc:sldMk cId="4142997562" sldId="278"/>
+            <ac:picMk id="4" creationId="{25FDA645-37CF-96DD-49F4-EF3881969D6C}"/>
+          </ac:picMkLst>
+        </pc:picChg>
+      </pc:sldChg>
+      <pc:sldChg chg="addSp delSp add mod">
+        <pc:chgData name="Don Joseph" userId="01aadf7fde9797fb" providerId="LiveId" clId="{ECD254F5-8452-483E-B5C3-D5A628E50987}" dt="2024-03-06T12:18:30.402" v="1667" actId="22"/>
+        <pc:sldMkLst>
+          <pc:docMk/>
+          <pc:sldMk cId="4223601982" sldId="279"/>
+        </pc:sldMkLst>
+        <pc:picChg chg="add del">
+          <ac:chgData name="Don Joseph" userId="01aadf7fde9797fb" providerId="LiveId" clId="{ECD254F5-8452-483E-B5C3-D5A628E50987}" dt="2024-03-06T12:18:30.181" v="1666" actId="478"/>
+          <ac:picMkLst>
+            <pc:docMk/>
+            <pc:sldMk cId="4223601982" sldId="279"/>
+            <ac:picMk id="3" creationId="{27AC3E32-0615-3755-10C5-869C63233E1E}"/>
+          </ac:picMkLst>
+        </pc:picChg>
+        <pc:picChg chg="del">
+          <ac:chgData name="Don Joseph" userId="01aadf7fde9797fb" providerId="LiveId" clId="{ECD254F5-8452-483E-B5C3-D5A628E50987}" dt="2024-03-06T12:18:07.196" v="1663" actId="478"/>
+          <ac:picMkLst>
+            <pc:docMk/>
+            <pc:sldMk cId="4223601982" sldId="279"/>
+            <ac:picMk id="4" creationId="{25FDA645-37CF-96DD-49F4-EF3881969D6C}"/>
+          </ac:picMkLst>
+        </pc:picChg>
+        <pc:picChg chg="add">
+          <ac:chgData name="Don Joseph" userId="01aadf7fde9797fb" providerId="LiveId" clId="{ECD254F5-8452-483E-B5C3-D5A628E50987}" dt="2024-03-06T12:18:30.402" v="1667" actId="22"/>
+          <ac:picMkLst>
+            <pc:docMk/>
+            <pc:sldMk cId="4223601982" sldId="279"/>
+            <ac:picMk id="6" creationId="{6B2E8DA6-1B70-74E8-C333-C91743A31DC9}"/>
+          </ac:picMkLst>
+        </pc:picChg>
+      </pc:sldChg>
+      <pc:sldChg chg="add">
+        <pc:chgData name="Don Joseph" userId="01aadf7fde9797fb" providerId="LiveId" clId="{ECD254F5-8452-483E-B5C3-D5A628E50987}" dt="2024-03-06T12:18:26.461" v="1665" actId="2890"/>
+        <pc:sldMkLst>
+          <pc:docMk/>
+          <pc:sldMk cId="2508219047" sldId="280"/>
+        </pc:sldMkLst>
+      </pc:sldChg>
+      <pc:sldChg chg="modSp add mod ord">
+        <pc:chgData name="Don Joseph" userId="01aadf7fde9797fb" providerId="LiveId" clId="{ECD254F5-8452-483E-B5C3-D5A628E50987}" dt="2024-03-06T12:34:07.836" v="1876" actId="20577"/>
+        <pc:sldMkLst>
+          <pc:docMk/>
+          <pc:sldMk cId="2057351055" sldId="281"/>
+        </pc:sldMkLst>
+        <pc:spChg chg="mod">
+          <ac:chgData name="Don Joseph" userId="01aadf7fde9797fb" providerId="LiveId" clId="{ECD254F5-8452-483E-B5C3-D5A628E50987}" dt="2024-03-06T12:34:07.836" v="1876" actId="20577"/>
+          <ac:spMkLst>
+            <pc:docMk/>
+            <pc:sldMk cId="2057351055" sldId="281"/>
+            <ac:spMk id="3" creationId="{F52D78B5-F45F-9C0A-0C97-7CBE40AC76E9}"/>
+          </ac:spMkLst>
+        </pc:spChg>
       </pc:sldChg>
     </pc:docChg>
   </pc:docChgLst>
@@ -1365,7 +1662,7 @@
           <a:p>
             <a:fld id="{D350CF16-44E2-4DB4-97A3-237468F9ABC0}" type="datetimeFigureOut">
               <a:rPr lang="en-GB" smtClean="0"/>
-              <a:t>26/02/2024</a:t>
+              <a:t>06/03/2024</a:t>
             </a:fld>
             <a:endParaRPr lang="en-GB"/>
           </a:p>
@@ -1565,7 +1862,7 @@
           <a:p>
             <a:fld id="{D350CF16-44E2-4DB4-97A3-237468F9ABC0}" type="datetimeFigureOut">
               <a:rPr lang="en-GB" smtClean="0"/>
-              <a:t>26/02/2024</a:t>
+              <a:t>06/03/2024</a:t>
             </a:fld>
             <a:endParaRPr lang="en-GB"/>
           </a:p>
@@ -1775,7 +2072,7 @@
           <a:p>
             <a:fld id="{D350CF16-44E2-4DB4-97A3-237468F9ABC0}" type="datetimeFigureOut">
               <a:rPr lang="en-GB" smtClean="0"/>
-              <a:t>26/02/2024</a:t>
+              <a:t>06/03/2024</a:t>
             </a:fld>
             <a:endParaRPr lang="en-GB"/>
           </a:p>
@@ -1975,7 +2272,7 @@
           <a:p>
             <a:fld id="{D350CF16-44E2-4DB4-97A3-237468F9ABC0}" type="datetimeFigureOut">
               <a:rPr lang="en-GB" smtClean="0"/>
-              <a:t>26/02/2024</a:t>
+              <a:t>06/03/2024</a:t>
             </a:fld>
             <a:endParaRPr lang="en-GB"/>
           </a:p>
@@ -2251,7 +2548,7 @@
           <a:p>
             <a:fld id="{D350CF16-44E2-4DB4-97A3-237468F9ABC0}" type="datetimeFigureOut">
               <a:rPr lang="en-GB" smtClean="0"/>
-              <a:t>26/02/2024</a:t>
+              <a:t>06/03/2024</a:t>
             </a:fld>
             <a:endParaRPr lang="en-GB"/>
           </a:p>
@@ -2519,7 +2816,7 @@
           <a:p>
             <a:fld id="{D350CF16-44E2-4DB4-97A3-237468F9ABC0}" type="datetimeFigureOut">
               <a:rPr lang="en-GB" smtClean="0"/>
-              <a:t>26/02/2024</a:t>
+              <a:t>06/03/2024</a:t>
             </a:fld>
             <a:endParaRPr lang="en-GB"/>
           </a:p>
@@ -2934,7 +3231,7 @@
           <a:p>
             <a:fld id="{D350CF16-44E2-4DB4-97A3-237468F9ABC0}" type="datetimeFigureOut">
               <a:rPr lang="en-GB" smtClean="0"/>
-              <a:t>26/02/2024</a:t>
+              <a:t>06/03/2024</a:t>
             </a:fld>
             <a:endParaRPr lang="en-GB"/>
           </a:p>
@@ -3076,7 +3373,7 @@
           <a:p>
             <a:fld id="{D350CF16-44E2-4DB4-97A3-237468F9ABC0}" type="datetimeFigureOut">
               <a:rPr lang="en-GB" smtClean="0"/>
-              <a:t>26/02/2024</a:t>
+              <a:t>06/03/2024</a:t>
             </a:fld>
             <a:endParaRPr lang="en-GB"/>
           </a:p>
@@ -3189,7 +3486,7 @@
           <a:p>
             <a:fld id="{D350CF16-44E2-4DB4-97A3-237468F9ABC0}" type="datetimeFigureOut">
               <a:rPr lang="en-GB" smtClean="0"/>
-              <a:t>26/02/2024</a:t>
+              <a:t>06/03/2024</a:t>
             </a:fld>
             <a:endParaRPr lang="en-GB"/>
           </a:p>
@@ -3502,7 +3799,7 @@
           <a:p>
             <a:fld id="{D350CF16-44E2-4DB4-97A3-237468F9ABC0}" type="datetimeFigureOut">
               <a:rPr lang="en-GB" smtClean="0"/>
-              <a:t>26/02/2024</a:t>
+              <a:t>06/03/2024</a:t>
             </a:fld>
             <a:endParaRPr lang="en-GB"/>
           </a:p>
@@ -3791,7 +4088,7 @@
           <a:p>
             <a:fld id="{D350CF16-44E2-4DB4-97A3-237468F9ABC0}" type="datetimeFigureOut">
               <a:rPr lang="en-GB" smtClean="0"/>
-              <a:t>26/02/2024</a:t>
+              <a:t>06/03/2024</a:t>
             </a:fld>
             <a:endParaRPr lang="en-GB"/>
           </a:p>
@@ -4034,7 +4331,7 @@
           <a:p>
             <a:fld id="{D350CF16-44E2-4DB4-97A3-237468F9ABC0}" type="datetimeFigureOut">
               <a:rPr lang="en-GB" smtClean="0"/>
-              <a:t>26/02/2024</a:t>
+              <a:t>06/03/2024</a:t>
             </a:fld>
             <a:endParaRPr lang="en-GB"/>
           </a:p>
@@ -5969,6 +6266,14 @@
 <file path=ppt/slides/slide15.xml><?xml version="1.0" encoding="utf-8"?>
 <p:sld xmlns:a="http://schemas.openxmlformats.org/drawingml/2006/main" xmlns:r="http://schemas.openxmlformats.org/officeDocument/2006/relationships" xmlns:p="http://schemas.openxmlformats.org/presentationml/2006/main">
   <p:cSld>
+    <p:bg>
+      <p:bgPr>
+        <a:solidFill>
+          <a:schemeClr val="bg1"/>
+        </a:solidFill>
+        <a:effectLst/>
+      </p:bgPr>
+    </p:bg>
     <p:spTree>
       <p:nvGrpSpPr>
         <p:cNvPr id="1" name=""/>
@@ -5985,127 +6290,1387 @@
       </p:grpSpPr>
       <p:sp>
         <p:nvSpPr>
-          <p:cNvPr id="3" name="Content Placeholder 2">
-            <a:extLst>
-              <a:ext uri="{FF2B5EF4-FFF2-40B4-BE49-F238E27FC236}">
-                <a16:creationId xmlns:a16="http://schemas.microsoft.com/office/drawing/2014/main" id="{F52D78B5-F45F-9C0A-0C97-7CBE40AC76E9}"/>
+          <p:cNvPr id="11" name="Rectangle 10">
+            <a:extLst>
+              <a:ext uri="{FF2B5EF4-FFF2-40B4-BE49-F238E27FC236}">
+                <a16:creationId xmlns:a16="http://schemas.microsoft.com/office/drawing/2014/main" id="{F3060C83-F051-4F0E-ABAD-AA0DFC48B218}"/>
+              </a:ext>
+              <a:ext uri="{C183D7F6-B498-43B3-948B-1728B52AA6E4}">
+                <adec:decorative xmlns:adec="http://schemas.microsoft.com/office/drawing/2017/decorative" val="1"/>
               </a:ext>
             </a:extLst>
           </p:cNvPr>
           <p:cNvSpPr>
-            <a:spLocks noGrp="1"/>
+            <a:spLocks noGrp="1" noRot="1" noChangeAspect="1" noMove="1" noResize="1" noEditPoints="1" noAdjustHandles="1" noChangeArrowheads="1" noChangeShapeType="1" noTextEdit="1"/>
           </p:cNvSpPr>
           <p:nvPr>
-            <p:ph idx="1"/>
+            <p:extLst>
+              <p:ext uri="{386F3935-93C4-4BCD-93E2-E3B085C9AB24}">
+                <p16:designElem xmlns:p16="http://schemas.microsoft.com/office/powerpoint/2015/main" val="1"/>
+              </p:ext>
+            </p:extLst>
           </p:nvPr>
         </p:nvSpPr>
         <p:spPr>
           <a:xfrm>
-            <a:off x="723900" y="289560"/>
-            <a:ext cx="10629900" cy="5887403"/>
+            <a:off x="0" y="0"/>
+            <a:ext cx="12192000" cy="6858000"/>
           </a:xfrm>
+          <a:prstGeom prst="rect">
+            <a:avLst/>
+          </a:prstGeom>
+          <a:solidFill>
+            <a:schemeClr val="bg1"/>
+          </a:solidFill>
+          <a:ln>
+            <a:noFill/>
+          </a:ln>
         </p:spPr>
-        <p:txBody>
-          <a:bodyPr>
-            <a:normAutofit/>
+        <p:style>
+          <a:lnRef idx="2">
+            <a:schemeClr val="accent1">
+              <a:shade val="50000"/>
+            </a:schemeClr>
+          </a:lnRef>
+          <a:fillRef idx="1">
+            <a:schemeClr val="accent1"/>
+          </a:fillRef>
+          <a:effectRef idx="0">
+            <a:schemeClr val="accent1"/>
+          </a:effectRef>
+          <a:fontRef idx="minor">
+            <a:schemeClr val="lt1"/>
+          </a:fontRef>
+        </p:style>
+        <p:txBody>
+          <a:bodyPr rtlCol="0" anchor="ctr"/>
+          <a:lstStyle/>
+          <a:p>
+            <a:pPr algn="ctr"/>
+            <a:endParaRPr lang="en-US" dirty="0"/>
+          </a:p>
+        </p:txBody>
+      </p:sp>
+      <p:sp>
+        <p:nvSpPr>
+          <p:cNvPr id="13" name="Freeform: Shape 12">
+            <a:extLst>
+              <a:ext uri="{FF2B5EF4-FFF2-40B4-BE49-F238E27FC236}">
+                <a16:creationId xmlns:a16="http://schemas.microsoft.com/office/drawing/2014/main" id="{83C98ABE-055B-441F-B07E-44F97F083C39}"/>
+              </a:ext>
+              <a:ext uri="{C183D7F6-B498-43B3-948B-1728B52AA6E4}">
+                <adec:decorative xmlns:adec="http://schemas.microsoft.com/office/drawing/2017/decorative" val="1"/>
+              </a:ext>
+            </a:extLst>
+          </p:cNvPr>
+          <p:cNvSpPr>
+            <a:spLocks noGrp="1" noRot="1" noChangeAspect="1" noMove="1" noResize="1" noEditPoints="1" noAdjustHandles="1" noChangeArrowheads="1" noChangeShapeType="1" noTextEdit="1"/>
+          </p:cNvSpPr>
+          <p:nvPr>
+            <p:extLst>
+              <p:ext uri="{386F3935-93C4-4BCD-93E2-E3B085C9AB24}">
+                <p16:designElem xmlns:p16="http://schemas.microsoft.com/office/powerpoint/2015/main" val="1"/>
+              </p:ext>
+            </p:extLst>
+          </p:nvPr>
+        </p:nvSpPr>
+        <p:spPr>
+          <a:xfrm rot="18900000" flipH="1">
+            <a:off x="-376156" y="-253670"/>
+            <a:ext cx="1827638" cy="1376989"/>
+          </a:xfrm>
+          <a:custGeom>
+            <a:avLst/>
+            <a:gdLst>
+              <a:gd name="connsiteX0" fmla="*/ 0 w 1827638"/>
+              <a:gd name="connsiteY0" fmla="*/ 987379 h 1376989"/>
+              <a:gd name="connsiteX1" fmla="*/ 987379 w 1827638"/>
+              <a:gd name="connsiteY1" fmla="*/ 0 h 1376989"/>
+              <a:gd name="connsiteX2" fmla="*/ 1827638 w 1827638"/>
+              <a:gd name="connsiteY2" fmla="*/ 840260 h 1376989"/>
+              <a:gd name="connsiteX3" fmla="*/ 1827638 w 1827638"/>
+              <a:gd name="connsiteY3" fmla="*/ 1376989 h 1376989"/>
+              <a:gd name="connsiteX4" fmla="*/ 0 w 1827638"/>
+              <a:gd name="connsiteY4" fmla="*/ 1376989 h 1376989"/>
+            </a:gdLst>
+            <a:ahLst/>
+            <a:cxnLst>
+              <a:cxn ang="0">
+                <a:pos x="connsiteX0" y="connsiteY0"/>
+              </a:cxn>
+              <a:cxn ang="0">
+                <a:pos x="connsiteX1" y="connsiteY1"/>
+              </a:cxn>
+              <a:cxn ang="0">
+                <a:pos x="connsiteX2" y="connsiteY2"/>
+              </a:cxn>
+              <a:cxn ang="0">
+                <a:pos x="connsiteX3" y="connsiteY3"/>
+              </a:cxn>
+              <a:cxn ang="0">
+                <a:pos x="connsiteX4" y="connsiteY4"/>
+              </a:cxn>
+            </a:cxnLst>
+            <a:rect l="l" t="t" r="r" b="b"/>
+            <a:pathLst>
+              <a:path w="1827638" h="1376989">
+                <a:moveTo>
+                  <a:pt x="0" y="987379"/>
+                </a:moveTo>
+                <a:lnTo>
+                  <a:pt x="987379" y="0"/>
+                </a:lnTo>
+                <a:lnTo>
+                  <a:pt x="1827638" y="840260"/>
+                </a:lnTo>
+                <a:lnTo>
+                  <a:pt x="1827638" y="1376989"/>
+                </a:lnTo>
+                <a:lnTo>
+                  <a:pt x="0" y="1376989"/>
+                </a:lnTo>
+                <a:close/>
+              </a:path>
+            </a:pathLst>
+          </a:custGeom>
+          <a:solidFill>
+            <a:schemeClr val="accent1">
+              <a:alpha val="30000"/>
+            </a:schemeClr>
+          </a:solidFill>
+          <a:ln>
+            <a:noFill/>
+          </a:ln>
+        </p:spPr>
+        <p:style>
+          <a:lnRef idx="2">
+            <a:schemeClr val="accent1">
+              <a:shade val="50000"/>
+            </a:schemeClr>
+          </a:lnRef>
+          <a:fillRef idx="1">
+            <a:schemeClr val="accent1"/>
+          </a:fillRef>
+          <a:effectRef idx="0">
+            <a:schemeClr val="accent1"/>
+          </a:effectRef>
+          <a:fontRef idx="minor">
+            <a:schemeClr val="lt1"/>
+          </a:fontRef>
+        </p:style>
+        <p:txBody>
+          <a:bodyPr rtlCol="0" anchor="ctr"/>
+          <a:lstStyle/>
+          <a:p>
+            <a:pPr algn="ctr"/>
+            <a:endParaRPr lang="en-US" dirty="0"/>
+          </a:p>
+        </p:txBody>
+      </p:sp>
+      <p:sp>
+        <p:nvSpPr>
+          <p:cNvPr id="15" name="Rectangle 14">
+            <a:extLst>
+              <a:ext uri="{FF2B5EF4-FFF2-40B4-BE49-F238E27FC236}">
+                <a16:creationId xmlns:a16="http://schemas.microsoft.com/office/drawing/2014/main" id="{29FDB030-9B49-4CED-8CCD-4D99382388AC}"/>
+              </a:ext>
+              <a:ext uri="{C183D7F6-B498-43B3-948B-1728B52AA6E4}">
+                <adec:decorative xmlns:adec="http://schemas.microsoft.com/office/drawing/2017/decorative" val="1"/>
+              </a:ext>
+            </a:extLst>
+          </p:cNvPr>
+          <p:cNvSpPr>
+            <a:spLocks noGrp="1" noRot="1" noChangeAspect="1" noMove="1" noResize="1" noEditPoints="1" noAdjustHandles="1" noChangeArrowheads="1" noChangeShapeType="1" noTextEdit="1"/>
+          </p:cNvSpPr>
+          <p:nvPr>
+            <p:extLst>
+              <p:ext uri="{386F3935-93C4-4BCD-93E2-E3B085C9AB24}">
+                <p16:designElem xmlns:p16="http://schemas.microsoft.com/office/powerpoint/2015/main" val="1"/>
+              </p:ext>
+            </p:extLst>
+          </p:nvPr>
+        </p:nvSpPr>
+        <p:spPr>
+          <a:xfrm rot="18900000" flipH="1">
+            <a:off x="891641" y="422146"/>
+            <a:ext cx="645368" cy="645368"/>
+          </a:xfrm>
+          <a:prstGeom prst="rect">
+            <a:avLst/>
+          </a:prstGeom>
+          <a:solidFill>
+            <a:schemeClr val="accent1">
+              <a:alpha val="30000"/>
+            </a:schemeClr>
+          </a:solidFill>
+          <a:ln>
+            <a:noFill/>
+          </a:ln>
+        </p:spPr>
+        <p:style>
+          <a:lnRef idx="2">
+            <a:schemeClr val="accent1">
+              <a:shade val="50000"/>
+            </a:schemeClr>
+          </a:lnRef>
+          <a:fillRef idx="1">
+            <a:schemeClr val="accent1"/>
+          </a:fillRef>
+          <a:effectRef idx="0">
+            <a:schemeClr val="accent1"/>
+          </a:effectRef>
+          <a:fontRef idx="minor">
+            <a:schemeClr val="lt1"/>
+          </a:fontRef>
+        </p:style>
+        <p:txBody>
+          <a:bodyPr rtlCol="0" anchor="ctr"/>
+          <a:lstStyle/>
+          <a:p>
+            <a:pPr algn="ctr"/>
+            <a:endParaRPr lang="en-US"/>
+          </a:p>
+        </p:txBody>
+      </p:sp>
+      <p:sp>
+        <p:nvSpPr>
+          <p:cNvPr id="17" name="Rectangle 16">
+            <a:extLst>
+              <a:ext uri="{FF2B5EF4-FFF2-40B4-BE49-F238E27FC236}">
+                <a16:creationId xmlns:a16="http://schemas.microsoft.com/office/drawing/2014/main" id="{3783CA14-24A1-485C-8B30-D6A5D87987AD}"/>
+              </a:ext>
+              <a:ext uri="{C183D7F6-B498-43B3-948B-1728B52AA6E4}">
+                <adec:decorative xmlns:adec="http://schemas.microsoft.com/office/drawing/2017/decorative" val="1"/>
+              </a:ext>
+            </a:extLst>
+          </p:cNvPr>
+          <p:cNvSpPr>
+            <a:spLocks noGrp="1" noRot="1" noChangeAspect="1" noMove="1" noResize="1" noEditPoints="1" noAdjustHandles="1" noChangeArrowheads="1" noChangeShapeType="1" noTextEdit="1"/>
+          </p:cNvSpPr>
+          <p:nvPr>
+            <p:extLst>
+              <p:ext uri="{386F3935-93C4-4BCD-93E2-E3B085C9AB24}">
+                <p16:designElem xmlns:p16="http://schemas.microsoft.com/office/powerpoint/2015/main" val="1"/>
+              </p:ext>
+            </p:extLst>
+          </p:nvPr>
+        </p:nvSpPr>
+        <p:spPr>
+          <a:xfrm rot="18900000" flipH="1">
+            <a:off x="10043482" y="655140"/>
+            <a:ext cx="687472" cy="687472"/>
+          </a:xfrm>
+          <a:prstGeom prst="rect">
+            <a:avLst/>
+          </a:prstGeom>
+          <a:solidFill>
+            <a:schemeClr val="accent4">
+              <a:alpha val="30000"/>
+            </a:schemeClr>
+          </a:solidFill>
+          <a:ln>
+            <a:noFill/>
+          </a:ln>
+        </p:spPr>
+        <p:style>
+          <a:lnRef idx="2">
+            <a:schemeClr val="accent1">
+              <a:shade val="50000"/>
+            </a:schemeClr>
+          </a:lnRef>
+          <a:fillRef idx="1">
+            <a:schemeClr val="accent1"/>
+          </a:fillRef>
+          <a:effectRef idx="0">
+            <a:schemeClr val="accent1"/>
+          </a:effectRef>
+          <a:fontRef idx="minor">
+            <a:schemeClr val="lt1"/>
+          </a:fontRef>
+        </p:style>
+        <p:txBody>
+          <a:bodyPr rtlCol="0" anchor="ctr"/>
+          <a:lstStyle/>
+          <a:p>
+            <a:pPr algn="ctr"/>
+            <a:endParaRPr lang="en-US"/>
+          </a:p>
+        </p:txBody>
+      </p:sp>
+      <p:sp>
+        <p:nvSpPr>
+          <p:cNvPr id="19" name="Freeform: Shape 18">
+            <a:extLst>
+              <a:ext uri="{FF2B5EF4-FFF2-40B4-BE49-F238E27FC236}">
+                <a16:creationId xmlns:a16="http://schemas.microsoft.com/office/drawing/2014/main" id="{9A97C86A-04D6-40F7-AE84-31AB43E6A846}"/>
+              </a:ext>
+              <a:ext uri="{C183D7F6-B498-43B3-948B-1728B52AA6E4}">
+                <adec:decorative xmlns:adec="http://schemas.microsoft.com/office/drawing/2017/decorative" val="1"/>
+              </a:ext>
+            </a:extLst>
+          </p:cNvPr>
+          <p:cNvSpPr>
+            <a:spLocks noGrp="1" noRot="1" noChangeAspect="1" noMove="1" noResize="1" noEditPoints="1" noAdjustHandles="1" noChangeArrowheads="1" noChangeShapeType="1" noTextEdit="1"/>
+          </p:cNvSpPr>
+          <p:nvPr>
+            <p:extLst>
+              <p:ext uri="{386F3935-93C4-4BCD-93E2-E3B085C9AB24}">
+                <p16:designElem xmlns:p16="http://schemas.microsoft.com/office/powerpoint/2015/main" val="1"/>
+              </p:ext>
+            </p:extLst>
+          </p:nvPr>
+        </p:nvSpPr>
+        <p:spPr>
+          <a:xfrm rot="10800000" flipH="1">
+            <a:off x="9356643" y="0"/>
+            <a:ext cx="2835357" cy="1480837"/>
+          </a:xfrm>
+          <a:custGeom>
+            <a:avLst/>
+            <a:gdLst>
+              <a:gd name="connsiteX0" fmla="*/ 2835357 w 2835357"/>
+              <a:gd name="connsiteY0" fmla="*/ 1480837 h 1480837"/>
+              <a:gd name="connsiteX1" fmla="*/ 0 w 2835357"/>
+              <a:gd name="connsiteY1" fmla="*/ 1480837 h 1480837"/>
+              <a:gd name="connsiteX2" fmla="*/ 1552727 w 2835357"/>
+              <a:gd name="connsiteY2" fmla="*/ 0 h 1480837"/>
+              <a:gd name="connsiteX3" fmla="*/ 2835357 w 2835357"/>
+              <a:gd name="connsiteY3" fmla="*/ 1223245 h 1480837"/>
+            </a:gdLst>
+            <a:ahLst/>
+            <a:cxnLst>
+              <a:cxn ang="0">
+                <a:pos x="connsiteX0" y="connsiteY0"/>
+              </a:cxn>
+              <a:cxn ang="0">
+                <a:pos x="connsiteX1" y="connsiteY1"/>
+              </a:cxn>
+              <a:cxn ang="0">
+                <a:pos x="connsiteX2" y="connsiteY2"/>
+              </a:cxn>
+              <a:cxn ang="0">
+                <a:pos x="connsiteX3" y="connsiteY3"/>
+              </a:cxn>
+            </a:cxnLst>
+            <a:rect l="l" t="t" r="r" b="b"/>
+            <a:pathLst>
+              <a:path w="2835357" h="1480837">
+                <a:moveTo>
+                  <a:pt x="2835357" y="1480837"/>
+                </a:moveTo>
+                <a:lnTo>
+                  <a:pt x="0" y="1480837"/>
+                </a:lnTo>
+                <a:lnTo>
+                  <a:pt x="1552727" y="0"/>
+                </a:lnTo>
+                <a:lnTo>
+                  <a:pt x="2835357" y="1223245"/>
+                </a:lnTo>
+                <a:close/>
+              </a:path>
+            </a:pathLst>
+          </a:custGeom>
+          <a:solidFill>
+            <a:schemeClr val="accent4">
+              <a:alpha val="30000"/>
+            </a:schemeClr>
+          </a:solidFill>
+          <a:ln>
+            <a:noFill/>
+          </a:ln>
+        </p:spPr>
+        <p:style>
+          <a:lnRef idx="2">
+            <a:schemeClr val="accent1">
+              <a:shade val="50000"/>
+            </a:schemeClr>
+          </a:lnRef>
+          <a:fillRef idx="1">
+            <a:schemeClr val="accent1"/>
+          </a:fillRef>
+          <a:effectRef idx="0">
+            <a:schemeClr val="accent1"/>
+          </a:effectRef>
+          <a:fontRef idx="minor">
+            <a:schemeClr val="lt1"/>
+          </a:fontRef>
+        </p:style>
+        <p:txBody>
+          <a:bodyPr wrap="square" rtlCol="0" anchor="ctr">
+            <a:noAutofit/>
           </a:bodyPr>
           <a:lstStyle/>
           <a:p>
-            <a:pPr marL="0" indent="0">
-              <a:buNone/>
-            </a:pPr>
-            <a:r>
-              <a:rPr lang="en-GB" sz="2000" u="sng" dirty="0"/>
-              <a:t>Potential issues with this approach</a:t>
-            </a:r>
-          </a:p>
-          <a:p>
-            <a:pPr marL="0" indent="0">
-              <a:buNone/>
-            </a:pPr>
-            <a:endParaRPr lang="en-GB" sz="2000" u="sng" dirty="0"/>
-          </a:p>
-          <a:p>
-            <a:pPr marL="0" indent="0">
-              <a:buNone/>
-            </a:pPr>
-            <a:r>
-              <a:rPr lang="en-GB" sz="1500" b="1" dirty="0"/>
-              <a:t>K-Means</a:t>
-            </a:r>
-          </a:p>
-          <a:p>
-            <a:r>
-              <a:rPr lang="en-GB" sz="1500" dirty="0"/>
-              <a:t>Heavily dependant on random initialisation of centroids in order to converge to an optimal solution – </a:t>
-            </a:r>
-            <a:r>
-              <a:rPr lang="en-GB" sz="1500" i="1" dirty="0"/>
-              <a:t>k-means++ algorithm</a:t>
-            </a:r>
-            <a:r>
-              <a:rPr lang="en-GB" sz="1500" dirty="0"/>
-              <a:t> solves this.</a:t>
-            </a:r>
-          </a:p>
-          <a:p>
-            <a:r>
-              <a:rPr lang="en-GB" sz="1500" dirty="0"/>
-              <a:t>Assumes clusters belong within a radial distance from a centroid – ‘spherical’ clusters.</a:t>
-            </a:r>
-          </a:p>
-          <a:p>
-            <a:r>
-              <a:rPr lang="en-GB" sz="1500" dirty="0"/>
-              <a:t>Ignores density of clusters. E.g. disparate clusters with a high densities of points may be drawn into a single cluster with a centroid between them.</a:t>
-            </a:r>
-          </a:p>
-          <a:p>
-            <a:r>
-              <a:rPr lang="en-GB" sz="1500" dirty="0"/>
-              <a:t>No mechanism for detecting outliers or uncertainties for points in overlapping clusters.</a:t>
-            </a:r>
-          </a:p>
-          <a:p>
-            <a:r>
-              <a:rPr lang="en-GB" sz="1500" dirty="0"/>
-              <a:t>Have to interpret the clusters numbers and almost manually select the number of clusters.</a:t>
-            </a:r>
-          </a:p>
-          <a:p>
-            <a:endParaRPr lang="en-GB" sz="1500" dirty="0"/>
-          </a:p>
-          <a:p>
-            <a:endParaRPr lang="en-GB" sz="1500" dirty="0"/>
-          </a:p>
-          <a:p>
-            <a:pPr marL="0" indent="0">
-              <a:buNone/>
-            </a:pPr>
-            <a:r>
-              <a:rPr lang="en-GB" sz="1500" b="1" dirty="0"/>
-              <a:t>RFM Analysis</a:t>
-            </a:r>
-          </a:p>
-          <a:p>
-            <a:r>
-              <a:rPr lang="en-GB" sz="1500" dirty="0"/>
-              <a:t>Clustering RFM scores was unable to infer in differences per category spend amongst the accounts available </a:t>
-            </a:r>
-            <a:r>
-              <a:rPr lang="en-GB" sz="1500" dirty="0">
-                <a:sym typeface="Wingdings" panose="05000000000000000000" pitchFamily="2" charset="2"/>
-              </a:rPr>
-              <a:t> Need another approach to be able to understand consumer behaviour in order to create targeted approaches.</a:t>
-            </a:r>
-            <a:endParaRPr lang="en-GB" sz="1500" dirty="0"/>
+            <a:pPr algn="ctr"/>
+            <a:endParaRPr lang="en-US" dirty="0"/>
+          </a:p>
+        </p:txBody>
+      </p:sp>
+      <p:sp>
+        <p:nvSpPr>
+          <p:cNvPr id="21" name="Isosceles Triangle 20">
+            <a:extLst>
+              <a:ext uri="{FF2B5EF4-FFF2-40B4-BE49-F238E27FC236}">
+                <a16:creationId xmlns:a16="http://schemas.microsoft.com/office/drawing/2014/main" id="{FF9F2414-84E8-453E-B1F3-389FDE8192D9}"/>
+              </a:ext>
+              <a:ext uri="{C183D7F6-B498-43B3-948B-1728B52AA6E4}">
+                <adec:decorative xmlns:adec="http://schemas.microsoft.com/office/drawing/2017/decorative" val="1"/>
+              </a:ext>
+            </a:extLst>
+          </p:cNvPr>
+          <p:cNvSpPr>
+            <a:spLocks noGrp="1" noRot="1" noChangeAspect="1" noMove="1" noResize="1" noEditPoints="1" noAdjustHandles="1" noChangeArrowheads="1" noChangeShapeType="1" noTextEdit="1"/>
+          </p:cNvSpPr>
+          <p:nvPr>
+            <p:extLst>
+              <p:ext uri="{386F3935-93C4-4BCD-93E2-E3B085C9AB24}">
+                <p16:designElem xmlns:p16="http://schemas.microsoft.com/office/powerpoint/2015/main" val="1"/>
+              </p:ext>
+            </p:extLst>
+          </p:nvPr>
+        </p:nvSpPr>
+        <p:spPr>
+          <a:xfrm flipH="1">
+            <a:off x="7976344" y="6115501"/>
+            <a:ext cx="1494513" cy="742499"/>
+          </a:xfrm>
+          <a:prstGeom prst="triangle">
+            <a:avLst/>
+          </a:prstGeom>
+          <a:solidFill>
+            <a:schemeClr val="accent1">
+              <a:alpha val="30000"/>
+            </a:schemeClr>
+          </a:solidFill>
+          <a:ln>
+            <a:noFill/>
+          </a:ln>
+        </p:spPr>
+        <p:style>
+          <a:lnRef idx="2">
+            <a:schemeClr val="accent1">
+              <a:shade val="50000"/>
+            </a:schemeClr>
+          </a:lnRef>
+          <a:fillRef idx="1">
+            <a:schemeClr val="accent1"/>
+          </a:fillRef>
+          <a:effectRef idx="0">
+            <a:schemeClr val="accent1"/>
+          </a:effectRef>
+          <a:fontRef idx="minor">
+            <a:schemeClr val="lt1"/>
+          </a:fontRef>
+        </p:style>
+        <p:txBody>
+          <a:bodyPr rtlCol="0" anchor="ctr"/>
+          <a:lstStyle/>
+          <a:p>
+            <a:pPr algn="ctr"/>
+            <a:endParaRPr lang="en-US"/>
+          </a:p>
+        </p:txBody>
+      </p:sp>
+      <p:pic>
+        <p:nvPicPr>
+          <p:cNvPr id="6" name="Picture 5" descr="A graph of a snake plot&#10;&#10;Description automatically generated">
+            <a:extLst>
+              <a:ext uri="{FF2B5EF4-FFF2-40B4-BE49-F238E27FC236}">
+                <a16:creationId xmlns:a16="http://schemas.microsoft.com/office/drawing/2014/main" id="{D9F389EE-ED3C-6171-EB6E-D7E9DD87432D}"/>
+              </a:ext>
+            </a:extLst>
+          </p:cNvPr>
+          <p:cNvPicPr>
+            <a:picLocks noChangeAspect="1"/>
+          </p:cNvPicPr>
+          <p:nvPr/>
+        </p:nvPicPr>
+        <p:blipFill>
+          <a:blip r:embed="rId2"/>
+          <a:stretch>
+            <a:fillRect/>
+          </a:stretch>
+        </p:blipFill>
+        <p:spPr>
+          <a:xfrm>
+            <a:off x="2116667" y="643467"/>
+            <a:ext cx="7958665" cy="5571065"/>
+          </a:xfrm>
+          <a:prstGeom prst="rect">
+            <a:avLst/>
+          </a:prstGeom>
+          <a:ln>
+            <a:noFill/>
+          </a:ln>
+        </p:spPr>
+      </p:pic>
+      <p:sp>
+        <p:nvSpPr>
+          <p:cNvPr id="23" name="Isosceles Triangle 22">
+            <a:extLst>
+              <a:ext uri="{FF2B5EF4-FFF2-40B4-BE49-F238E27FC236}">
+                <a16:creationId xmlns:a16="http://schemas.microsoft.com/office/drawing/2014/main" id="{3ECA69A1-7536-43AC-85EF-C7106179F5ED}"/>
+              </a:ext>
+              <a:ext uri="{C183D7F6-B498-43B3-948B-1728B52AA6E4}">
+                <adec:decorative xmlns:adec="http://schemas.microsoft.com/office/drawing/2017/decorative" val="1"/>
+              </a:ext>
+            </a:extLst>
+          </p:cNvPr>
+          <p:cNvSpPr>
+            <a:spLocks noGrp="1" noRot="1" noChangeAspect="1" noMove="1" noResize="1" noEditPoints="1" noAdjustHandles="1" noChangeArrowheads="1" noChangeShapeType="1" noTextEdit="1"/>
+          </p:cNvSpPr>
+          <p:nvPr>
+            <p:extLst>
+              <p:ext uri="{386F3935-93C4-4BCD-93E2-E3B085C9AB24}">
+                <p16:designElem xmlns:p16="http://schemas.microsoft.com/office/powerpoint/2015/main" val="1"/>
+              </p:ext>
+            </p:extLst>
+          </p:nvPr>
+        </p:nvSpPr>
+        <p:spPr>
+          <a:xfrm flipH="1">
+            <a:off x="7604080" y="6453143"/>
+            <a:ext cx="814903" cy="404857"/>
+          </a:xfrm>
+          <a:prstGeom prst="triangle">
+            <a:avLst/>
+          </a:prstGeom>
+          <a:solidFill>
+            <a:schemeClr val="accent1">
+              <a:alpha val="30000"/>
+            </a:schemeClr>
+          </a:solidFill>
+          <a:ln>
+            <a:noFill/>
+          </a:ln>
+        </p:spPr>
+        <p:style>
+          <a:lnRef idx="2">
+            <a:schemeClr val="accent1">
+              <a:shade val="50000"/>
+            </a:schemeClr>
+          </a:lnRef>
+          <a:fillRef idx="1">
+            <a:schemeClr val="accent1"/>
+          </a:fillRef>
+          <a:effectRef idx="0">
+            <a:schemeClr val="accent1"/>
+          </a:effectRef>
+          <a:fontRef idx="minor">
+            <a:schemeClr val="lt1"/>
+          </a:fontRef>
+        </p:style>
+        <p:txBody>
+          <a:bodyPr rtlCol="0" anchor="ctr"/>
+          <a:lstStyle/>
+          <a:p>
+            <a:pPr algn="ctr"/>
+            <a:endParaRPr lang="en-US"/>
           </a:p>
         </p:txBody>
       </p:sp>
     </p:spTree>
     <p:extLst>
       <p:ext uri="{BB962C8B-B14F-4D97-AF65-F5344CB8AC3E}">
-        <p14:creationId xmlns:p14="http://schemas.microsoft.com/office/powerpoint/2010/main" val="4199166108"/>
+        <p14:creationId xmlns:p14="http://schemas.microsoft.com/office/powerpoint/2010/main" val="3095813648"/>
+      </p:ext>
+    </p:extLst>
+  </p:cSld>
+  <p:clrMapOvr>
+    <a:masterClrMapping/>
+  </p:clrMapOvr>
+</p:sld>
+</file>
+
+<file path=ppt/slides/slide16.xml><?xml version="1.0" encoding="utf-8"?>
+<p:sld xmlns:a="http://schemas.openxmlformats.org/drawingml/2006/main" xmlns:r="http://schemas.openxmlformats.org/officeDocument/2006/relationships" xmlns:p="http://schemas.openxmlformats.org/presentationml/2006/main">
+  <p:cSld>
+    <p:bg>
+      <p:bgPr>
+        <a:solidFill>
+          <a:schemeClr val="bg1"/>
+        </a:solidFill>
+        <a:effectLst/>
+      </p:bgPr>
+    </p:bg>
+    <p:spTree>
+      <p:nvGrpSpPr>
+        <p:cNvPr id="1" name=""/>
+        <p:cNvGrpSpPr/>
+        <p:nvPr/>
+      </p:nvGrpSpPr>
+      <p:grpSpPr>
+        <a:xfrm>
+          <a:off x="0" y="0"/>
+          <a:ext cx="0" cy="0"/>
+          <a:chOff x="0" y="0"/>
+          <a:chExt cx="0" cy="0"/>
+        </a:xfrm>
+      </p:grpSpPr>
+      <p:sp>
+        <p:nvSpPr>
+          <p:cNvPr id="11" name="Rectangle 10">
+            <a:extLst>
+              <a:ext uri="{FF2B5EF4-FFF2-40B4-BE49-F238E27FC236}">
+                <a16:creationId xmlns:a16="http://schemas.microsoft.com/office/drawing/2014/main" id="{F3060C83-F051-4F0E-ABAD-AA0DFC48B218}"/>
+              </a:ext>
+              <a:ext uri="{C183D7F6-B498-43B3-948B-1728B52AA6E4}">
+                <adec:decorative xmlns:adec="http://schemas.microsoft.com/office/drawing/2017/decorative" val="1"/>
+              </a:ext>
+            </a:extLst>
+          </p:cNvPr>
+          <p:cNvSpPr>
+            <a:spLocks noGrp="1" noRot="1" noChangeAspect="1" noMove="1" noResize="1" noEditPoints="1" noAdjustHandles="1" noChangeArrowheads="1" noChangeShapeType="1" noTextEdit="1"/>
+          </p:cNvSpPr>
+          <p:nvPr>
+            <p:extLst>
+              <p:ext uri="{386F3935-93C4-4BCD-93E2-E3B085C9AB24}">
+                <p16:designElem xmlns:p16="http://schemas.microsoft.com/office/powerpoint/2015/main" val="1"/>
+              </p:ext>
+            </p:extLst>
+          </p:nvPr>
+        </p:nvSpPr>
+        <p:spPr>
+          <a:xfrm>
+            <a:off x="0" y="0"/>
+            <a:ext cx="12192000" cy="6858000"/>
+          </a:xfrm>
+          <a:prstGeom prst="rect">
+            <a:avLst/>
+          </a:prstGeom>
+          <a:solidFill>
+            <a:schemeClr val="bg1"/>
+          </a:solidFill>
+          <a:ln>
+            <a:noFill/>
+          </a:ln>
+        </p:spPr>
+        <p:style>
+          <a:lnRef idx="2">
+            <a:schemeClr val="accent1">
+              <a:shade val="50000"/>
+            </a:schemeClr>
+          </a:lnRef>
+          <a:fillRef idx="1">
+            <a:schemeClr val="accent1"/>
+          </a:fillRef>
+          <a:effectRef idx="0">
+            <a:schemeClr val="accent1"/>
+          </a:effectRef>
+          <a:fontRef idx="minor">
+            <a:schemeClr val="lt1"/>
+          </a:fontRef>
+        </p:style>
+        <p:txBody>
+          <a:bodyPr rtlCol="0" anchor="ctr"/>
+          <a:lstStyle/>
+          <a:p>
+            <a:pPr algn="ctr"/>
+            <a:endParaRPr lang="en-US" dirty="0"/>
+          </a:p>
+        </p:txBody>
+      </p:sp>
+      <p:sp>
+        <p:nvSpPr>
+          <p:cNvPr id="13" name="Freeform: Shape 12">
+            <a:extLst>
+              <a:ext uri="{FF2B5EF4-FFF2-40B4-BE49-F238E27FC236}">
+                <a16:creationId xmlns:a16="http://schemas.microsoft.com/office/drawing/2014/main" id="{83C98ABE-055B-441F-B07E-44F97F083C39}"/>
+              </a:ext>
+              <a:ext uri="{C183D7F6-B498-43B3-948B-1728B52AA6E4}">
+                <adec:decorative xmlns:adec="http://schemas.microsoft.com/office/drawing/2017/decorative" val="1"/>
+              </a:ext>
+            </a:extLst>
+          </p:cNvPr>
+          <p:cNvSpPr>
+            <a:spLocks noGrp="1" noRot="1" noChangeAspect="1" noMove="1" noResize="1" noEditPoints="1" noAdjustHandles="1" noChangeArrowheads="1" noChangeShapeType="1" noTextEdit="1"/>
+          </p:cNvSpPr>
+          <p:nvPr>
+            <p:extLst>
+              <p:ext uri="{386F3935-93C4-4BCD-93E2-E3B085C9AB24}">
+                <p16:designElem xmlns:p16="http://schemas.microsoft.com/office/powerpoint/2015/main" val="1"/>
+              </p:ext>
+            </p:extLst>
+          </p:nvPr>
+        </p:nvSpPr>
+        <p:spPr>
+          <a:xfrm rot="18900000" flipH="1">
+            <a:off x="-376156" y="-253670"/>
+            <a:ext cx="1827638" cy="1376989"/>
+          </a:xfrm>
+          <a:custGeom>
+            <a:avLst/>
+            <a:gdLst>
+              <a:gd name="connsiteX0" fmla="*/ 0 w 1827638"/>
+              <a:gd name="connsiteY0" fmla="*/ 987379 h 1376989"/>
+              <a:gd name="connsiteX1" fmla="*/ 987379 w 1827638"/>
+              <a:gd name="connsiteY1" fmla="*/ 0 h 1376989"/>
+              <a:gd name="connsiteX2" fmla="*/ 1827638 w 1827638"/>
+              <a:gd name="connsiteY2" fmla="*/ 840260 h 1376989"/>
+              <a:gd name="connsiteX3" fmla="*/ 1827638 w 1827638"/>
+              <a:gd name="connsiteY3" fmla="*/ 1376989 h 1376989"/>
+              <a:gd name="connsiteX4" fmla="*/ 0 w 1827638"/>
+              <a:gd name="connsiteY4" fmla="*/ 1376989 h 1376989"/>
+            </a:gdLst>
+            <a:ahLst/>
+            <a:cxnLst>
+              <a:cxn ang="0">
+                <a:pos x="connsiteX0" y="connsiteY0"/>
+              </a:cxn>
+              <a:cxn ang="0">
+                <a:pos x="connsiteX1" y="connsiteY1"/>
+              </a:cxn>
+              <a:cxn ang="0">
+                <a:pos x="connsiteX2" y="connsiteY2"/>
+              </a:cxn>
+              <a:cxn ang="0">
+                <a:pos x="connsiteX3" y="connsiteY3"/>
+              </a:cxn>
+              <a:cxn ang="0">
+                <a:pos x="connsiteX4" y="connsiteY4"/>
+              </a:cxn>
+            </a:cxnLst>
+            <a:rect l="l" t="t" r="r" b="b"/>
+            <a:pathLst>
+              <a:path w="1827638" h="1376989">
+                <a:moveTo>
+                  <a:pt x="0" y="987379"/>
+                </a:moveTo>
+                <a:lnTo>
+                  <a:pt x="987379" y="0"/>
+                </a:lnTo>
+                <a:lnTo>
+                  <a:pt x="1827638" y="840260"/>
+                </a:lnTo>
+                <a:lnTo>
+                  <a:pt x="1827638" y="1376989"/>
+                </a:lnTo>
+                <a:lnTo>
+                  <a:pt x="0" y="1376989"/>
+                </a:lnTo>
+                <a:close/>
+              </a:path>
+            </a:pathLst>
+          </a:custGeom>
+          <a:solidFill>
+            <a:schemeClr val="accent1">
+              <a:alpha val="30000"/>
+            </a:schemeClr>
+          </a:solidFill>
+          <a:ln>
+            <a:noFill/>
+          </a:ln>
+        </p:spPr>
+        <p:style>
+          <a:lnRef idx="2">
+            <a:schemeClr val="accent1">
+              <a:shade val="50000"/>
+            </a:schemeClr>
+          </a:lnRef>
+          <a:fillRef idx="1">
+            <a:schemeClr val="accent1"/>
+          </a:fillRef>
+          <a:effectRef idx="0">
+            <a:schemeClr val="accent1"/>
+          </a:effectRef>
+          <a:fontRef idx="minor">
+            <a:schemeClr val="lt1"/>
+          </a:fontRef>
+        </p:style>
+        <p:txBody>
+          <a:bodyPr rtlCol="0" anchor="ctr"/>
+          <a:lstStyle/>
+          <a:p>
+            <a:pPr algn="ctr"/>
+            <a:endParaRPr lang="en-US" dirty="0"/>
+          </a:p>
+        </p:txBody>
+      </p:sp>
+      <p:sp>
+        <p:nvSpPr>
+          <p:cNvPr id="15" name="Rectangle 14">
+            <a:extLst>
+              <a:ext uri="{FF2B5EF4-FFF2-40B4-BE49-F238E27FC236}">
+                <a16:creationId xmlns:a16="http://schemas.microsoft.com/office/drawing/2014/main" id="{29FDB030-9B49-4CED-8CCD-4D99382388AC}"/>
+              </a:ext>
+              <a:ext uri="{C183D7F6-B498-43B3-948B-1728B52AA6E4}">
+                <adec:decorative xmlns:adec="http://schemas.microsoft.com/office/drawing/2017/decorative" val="1"/>
+              </a:ext>
+            </a:extLst>
+          </p:cNvPr>
+          <p:cNvSpPr>
+            <a:spLocks noGrp="1" noRot="1" noChangeAspect="1" noMove="1" noResize="1" noEditPoints="1" noAdjustHandles="1" noChangeArrowheads="1" noChangeShapeType="1" noTextEdit="1"/>
+          </p:cNvSpPr>
+          <p:nvPr>
+            <p:extLst>
+              <p:ext uri="{386F3935-93C4-4BCD-93E2-E3B085C9AB24}">
+                <p16:designElem xmlns:p16="http://schemas.microsoft.com/office/powerpoint/2015/main" val="1"/>
+              </p:ext>
+            </p:extLst>
+          </p:nvPr>
+        </p:nvSpPr>
+        <p:spPr>
+          <a:xfrm rot="18900000" flipH="1">
+            <a:off x="891641" y="422146"/>
+            <a:ext cx="645368" cy="645368"/>
+          </a:xfrm>
+          <a:prstGeom prst="rect">
+            <a:avLst/>
+          </a:prstGeom>
+          <a:solidFill>
+            <a:schemeClr val="accent1">
+              <a:alpha val="30000"/>
+            </a:schemeClr>
+          </a:solidFill>
+          <a:ln>
+            <a:noFill/>
+          </a:ln>
+        </p:spPr>
+        <p:style>
+          <a:lnRef idx="2">
+            <a:schemeClr val="accent1">
+              <a:shade val="50000"/>
+            </a:schemeClr>
+          </a:lnRef>
+          <a:fillRef idx="1">
+            <a:schemeClr val="accent1"/>
+          </a:fillRef>
+          <a:effectRef idx="0">
+            <a:schemeClr val="accent1"/>
+          </a:effectRef>
+          <a:fontRef idx="minor">
+            <a:schemeClr val="lt1"/>
+          </a:fontRef>
+        </p:style>
+        <p:txBody>
+          <a:bodyPr rtlCol="0" anchor="ctr"/>
+          <a:lstStyle/>
+          <a:p>
+            <a:pPr algn="ctr"/>
+            <a:endParaRPr lang="en-US"/>
+          </a:p>
+        </p:txBody>
+      </p:sp>
+      <p:sp>
+        <p:nvSpPr>
+          <p:cNvPr id="17" name="Rectangle 16">
+            <a:extLst>
+              <a:ext uri="{FF2B5EF4-FFF2-40B4-BE49-F238E27FC236}">
+                <a16:creationId xmlns:a16="http://schemas.microsoft.com/office/drawing/2014/main" id="{3783CA14-24A1-485C-8B30-D6A5D87987AD}"/>
+              </a:ext>
+              <a:ext uri="{C183D7F6-B498-43B3-948B-1728B52AA6E4}">
+                <adec:decorative xmlns:adec="http://schemas.microsoft.com/office/drawing/2017/decorative" val="1"/>
+              </a:ext>
+            </a:extLst>
+          </p:cNvPr>
+          <p:cNvSpPr>
+            <a:spLocks noGrp="1" noRot="1" noChangeAspect="1" noMove="1" noResize="1" noEditPoints="1" noAdjustHandles="1" noChangeArrowheads="1" noChangeShapeType="1" noTextEdit="1"/>
+          </p:cNvSpPr>
+          <p:nvPr>
+            <p:extLst>
+              <p:ext uri="{386F3935-93C4-4BCD-93E2-E3B085C9AB24}">
+                <p16:designElem xmlns:p16="http://schemas.microsoft.com/office/powerpoint/2015/main" val="1"/>
+              </p:ext>
+            </p:extLst>
+          </p:nvPr>
+        </p:nvSpPr>
+        <p:spPr>
+          <a:xfrm rot="18900000" flipH="1">
+            <a:off x="10043482" y="655140"/>
+            <a:ext cx="687472" cy="687472"/>
+          </a:xfrm>
+          <a:prstGeom prst="rect">
+            <a:avLst/>
+          </a:prstGeom>
+          <a:solidFill>
+            <a:schemeClr val="accent4">
+              <a:alpha val="30000"/>
+            </a:schemeClr>
+          </a:solidFill>
+          <a:ln>
+            <a:noFill/>
+          </a:ln>
+        </p:spPr>
+        <p:style>
+          <a:lnRef idx="2">
+            <a:schemeClr val="accent1">
+              <a:shade val="50000"/>
+            </a:schemeClr>
+          </a:lnRef>
+          <a:fillRef idx="1">
+            <a:schemeClr val="accent1"/>
+          </a:fillRef>
+          <a:effectRef idx="0">
+            <a:schemeClr val="accent1"/>
+          </a:effectRef>
+          <a:fontRef idx="minor">
+            <a:schemeClr val="lt1"/>
+          </a:fontRef>
+        </p:style>
+        <p:txBody>
+          <a:bodyPr rtlCol="0" anchor="ctr"/>
+          <a:lstStyle/>
+          <a:p>
+            <a:pPr algn="ctr"/>
+            <a:endParaRPr lang="en-US"/>
+          </a:p>
+        </p:txBody>
+      </p:sp>
+      <p:sp>
+        <p:nvSpPr>
+          <p:cNvPr id="19" name="Freeform: Shape 18">
+            <a:extLst>
+              <a:ext uri="{FF2B5EF4-FFF2-40B4-BE49-F238E27FC236}">
+                <a16:creationId xmlns:a16="http://schemas.microsoft.com/office/drawing/2014/main" id="{9A97C86A-04D6-40F7-AE84-31AB43E6A846}"/>
+              </a:ext>
+              <a:ext uri="{C183D7F6-B498-43B3-948B-1728B52AA6E4}">
+                <adec:decorative xmlns:adec="http://schemas.microsoft.com/office/drawing/2017/decorative" val="1"/>
+              </a:ext>
+            </a:extLst>
+          </p:cNvPr>
+          <p:cNvSpPr>
+            <a:spLocks noGrp="1" noRot="1" noChangeAspect="1" noMove="1" noResize="1" noEditPoints="1" noAdjustHandles="1" noChangeArrowheads="1" noChangeShapeType="1" noTextEdit="1"/>
+          </p:cNvSpPr>
+          <p:nvPr>
+            <p:extLst>
+              <p:ext uri="{386F3935-93C4-4BCD-93E2-E3B085C9AB24}">
+                <p16:designElem xmlns:p16="http://schemas.microsoft.com/office/powerpoint/2015/main" val="1"/>
+              </p:ext>
+            </p:extLst>
+          </p:nvPr>
+        </p:nvSpPr>
+        <p:spPr>
+          <a:xfrm rot="10800000" flipH="1">
+            <a:off x="9356643" y="0"/>
+            <a:ext cx="2835357" cy="1480837"/>
+          </a:xfrm>
+          <a:custGeom>
+            <a:avLst/>
+            <a:gdLst>
+              <a:gd name="connsiteX0" fmla="*/ 2835357 w 2835357"/>
+              <a:gd name="connsiteY0" fmla="*/ 1480837 h 1480837"/>
+              <a:gd name="connsiteX1" fmla="*/ 0 w 2835357"/>
+              <a:gd name="connsiteY1" fmla="*/ 1480837 h 1480837"/>
+              <a:gd name="connsiteX2" fmla="*/ 1552727 w 2835357"/>
+              <a:gd name="connsiteY2" fmla="*/ 0 h 1480837"/>
+              <a:gd name="connsiteX3" fmla="*/ 2835357 w 2835357"/>
+              <a:gd name="connsiteY3" fmla="*/ 1223245 h 1480837"/>
+            </a:gdLst>
+            <a:ahLst/>
+            <a:cxnLst>
+              <a:cxn ang="0">
+                <a:pos x="connsiteX0" y="connsiteY0"/>
+              </a:cxn>
+              <a:cxn ang="0">
+                <a:pos x="connsiteX1" y="connsiteY1"/>
+              </a:cxn>
+              <a:cxn ang="0">
+                <a:pos x="connsiteX2" y="connsiteY2"/>
+              </a:cxn>
+              <a:cxn ang="0">
+                <a:pos x="connsiteX3" y="connsiteY3"/>
+              </a:cxn>
+            </a:cxnLst>
+            <a:rect l="l" t="t" r="r" b="b"/>
+            <a:pathLst>
+              <a:path w="2835357" h="1480837">
+                <a:moveTo>
+                  <a:pt x="2835357" y="1480837"/>
+                </a:moveTo>
+                <a:lnTo>
+                  <a:pt x="0" y="1480837"/>
+                </a:lnTo>
+                <a:lnTo>
+                  <a:pt x="1552727" y="0"/>
+                </a:lnTo>
+                <a:lnTo>
+                  <a:pt x="2835357" y="1223245"/>
+                </a:lnTo>
+                <a:close/>
+              </a:path>
+            </a:pathLst>
+          </a:custGeom>
+          <a:solidFill>
+            <a:schemeClr val="accent4">
+              <a:alpha val="30000"/>
+            </a:schemeClr>
+          </a:solidFill>
+          <a:ln>
+            <a:noFill/>
+          </a:ln>
+        </p:spPr>
+        <p:style>
+          <a:lnRef idx="2">
+            <a:schemeClr val="accent1">
+              <a:shade val="50000"/>
+            </a:schemeClr>
+          </a:lnRef>
+          <a:fillRef idx="1">
+            <a:schemeClr val="accent1"/>
+          </a:fillRef>
+          <a:effectRef idx="0">
+            <a:schemeClr val="accent1"/>
+          </a:effectRef>
+          <a:fontRef idx="minor">
+            <a:schemeClr val="lt1"/>
+          </a:fontRef>
+        </p:style>
+        <p:txBody>
+          <a:bodyPr wrap="square" rtlCol="0" anchor="ctr">
+            <a:noAutofit/>
+          </a:bodyPr>
+          <a:lstStyle/>
+          <a:p>
+            <a:pPr algn="ctr"/>
+            <a:endParaRPr lang="en-US" dirty="0"/>
+          </a:p>
+        </p:txBody>
+      </p:sp>
+      <p:sp>
+        <p:nvSpPr>
+          <p:cNvPr id="21" name="Isosceles Triangle 20">
+            <a:extLst>
+              <a:ext uri="{FF2B5EF4-FFF2-40B4-BE49-F238E27FC236}">
+                <a16:creationId xmlns:a16="http://schemas.microsoft.com/office/drawing/2014/main" id="{FF9F2414-84E8-453E-B1F3-389FDE8192D9}"/>
+              </a:ext>
+              <a:ext uri="{C183D7F6-B498-43B3-948B-1728B52AA6E4}">
+                <adec:decorative xmlns:adec="http://schemas.microsoft.com/office/drawing/2017/decorative" val="1"/>
+              </a:ext>
+            </a:extLst>
+          </p:cNvPr>
+          <p:cNvSpPr>
+            <a:spLocks noGrp="1" noRot="1" noChangeAspect="1" noMove="1" noResize="1" noEditPoints="1" noAdjustHandles="1" noChangeArrowheads="1" noChangeShapeType="1" noTextEdit="1"/>
+          </p:cNvSpPr>
+          <p:nvPr>
+            <p:extLst>
+              <p:ext uri="{386F3935-93C4-4BCD-93E2-E3B085C9AB24}">
+                <p16:designElem xmlns:p16="http://schemas.microsoft.com/office/powerpoint/2015/main" val="1"/>
+              </p:ext>
+            </p:extLst>
+          </p:nvPr>
+        </p:nvSpPr>
+        <p:spPr>
+          <a:xfrm flipH="1">
+            <a:off x="7976344" y="6115501"/>
+            <a:ext cx="1494513" cy="742499"/>
+          </a:xfrm>
+          <a:prstGeom prst="triangle">
+            <a:avLst/>
+          </a:prstGeom>
+          <a:solidFill>
+            <a:schemeClr val="accent1">
+              <a:alpha val="30000"/>
+            </a:schemeClr>
+          </a:solidFill>
+          <a:ln>
+            <a:noFill/>
+          </a:ln>
+        </p:spPr>
+        <p:style>
+          <a:lnRef idx="2">
+            <a:schemeClr val="accent1">
+              <a:shade val="50000"/>
+            </a:schemeClr>
+          </a:lnRef>
+          <a:fillRef idx="1">
+            <a:schemeClr val="accent1"/>
+          </a:fillRef>
+          <a:effectRef idx="0">
+            <a:schemeClr val="accent1"/>
+          </a:effectRef>
+          <a:fontRef idx="minor">
+            <a:schemeClr val="lt1"/>
+          </a:fontRef>
+        </p:style>
+        <p:txBody>
+          <a:bodyPr rtlCol="0" anchor="ctr"/>
+          <a:lstStyle/>
+          <a:p>
+            <a:pPr algn="ctr"/>
+            <a:endParaRPr lang="en-US"/>
+          </a:p>
+        </p:txBody>
+      </p:sp>
+      <p:sp>
+        <p:nvSpPr>
+          <p:cNvPr id="23" name="Isosceles Triangle 22">
+            <a:extLst>
+              <a:ext uri="{FF2B5EF4-FFF2-40B4-BE49-F238E27FC236}">
+                <a16:creationId xmlns:a16="http://schemas.microsoft.com/office/drawing/2014/main" id="{3ECA69A1-7536-43AC-85EF-C7106179F5ED}"/>
+              </a:ext>
+              <a:ext uri="{C183D7F6-B498-43B3-948B-1728B52AA6E4}">
+                <adec:decorative xmlns:adec="http://schemas.microsoft.com/office/drawing/2017/decorative" val="1"/>
+              </a:ext>
+            </a:extLst>
+          </p:cNvPr>
+          <p:cNvSpPr>
+            <a:spLocks noGrp="1" noRot="1" noChangeAspect="1" noMove="1" noResize="1" noEditPoints="1" noAdjustHandles="1" noChangeArrowheads="1" noChangeShapeType="1" noTextEdit="1"/>
+          </p:cNvSpPr>
+          <p:nvPr>
+            <p:extLst>
+              <p:ext uri="{386F3935-93C4-4BCD-93E2-E3B085C9AB24}">
+                <p16:designElem xmlns:p16="http://schemas.microsoft.com/office/powerpoint/2015/main" val="1"/>
+              </p:ext>
+            </p:extLst>
+          </p:nvPr>
+        </p:nvSpPr>
+        <p:spPr>
+          <a:xfrm flipH="1">
+            <a:off x="7604080" y="6453143"/>
+            <a:ext cx="814903" cy="404857"/>
+          </a:xfrm>
+          <a:prstGeom prst="triangle">
+            <a:avLst/>
+          </a:prstGeom>
+          <a:solidFill>
+            <a:schemeClr val="accent1">
+              <a:alpha val="30000"/>
+            </a:schemeClr>
+          </a:solidFill>
+          <a:ln>
+            <a:noFill/>
+          </a:ln>
+        </p:spPr>
+        <p:style>
+          <a:lnRef idx="2">
+            <a:schemeClr val="accent1">
+              <a:shade val="50000"/>
+            </a:schemeClr>
+          </a:lnRef>
+          <a:fillRef idx="1">
+            <a:schemeClr val="accent1"/>
+          </a:fillRef>
+          <a:effectRef idx="0">
+            <a:schemeClr val="accent1"/>
+          </a:effectRef>
+          <a:fontRef idx="minor">
+            <a:schemeClr val="lt1"/>
+          </a:fontRef>
+        </p:style>
+        <p:txBody>
+          <a:bodyPr rtlCol="0" anchor="ctr"/>
+          <a:lstStyle/>
+          <a:p>
+            <a:pPr algn="ctr"/>
+            <a:endParaRPr lang="en-US"/>
+          </a:p>
+        </p:txBody>
+      </p:sp>
+      <p:pic>
+        <p:nvPicPr>
+          <p:cNvPr id="3" name="Picture 2">
+            <a:extLst>
+              <a:ext uri="{FF2B5EF4-FFF2-40B4-BE49-F238E27FC236}">
+                <a16:creationId xmlns:a16="http://schemas.microsoft.com/office/drawing/2014/main" id="{BE6B87E1-C670-8EAE-534D-51D86AFD1B41}"/>
+              </a:ext>
+            </a:extLst>
+          </p:cNvPr>
+          <p:cNvPicPr>
+            <a:picLocks noChangeAspect="1"/>
+          </p:cNvPicPr>
+          <p:nvPr/>
+        </p:nvPicPr>
+        <p:blipFill>
+          <a:blip r:embed="rId2"/>
+          <a:stretch>
+            <a:fillRect/>
+          </a:stretch>
+        </p:blipFill>
+        <p:spPr>
+          <a:xfrm>
+            <a:off x="1043996" y="1818479"/>
+            <a:ext cx="9907228" cy="3378854"/>
+          </a:xfrm>
+          <a:prstGeom prst="rect">
+            <a:avLst/>
+          </a:prstGeom>
+        </p:spPr>
+      </p:pic>
+    </p:spTree>
+    <p:extLst>
+      <p:ext uri="{BB962C8B-B14F-4D97-AF65-F5344CB8AC3E}">
+        <p14:creationId xmlns:p14="http://schemas.microsoft.com/office/powerpoint/2010/main" val="4006794026"/>
+      </p:ext>
+    </p:extLst>
+  </p:cSld>
+  <p:clrMapOvr>
+    <a:masterClrMapping/>
+  </p:clrMapOvr>
+</p:sld>
+</file>
+
+<file path=ppt/slides/slide17.xml><?xml version="1.0" encoding="utf-8"?>
+<p:sld xmlns:a="http://schemas.openxmlformats.org/drawingml/2006/main" xmlns:r="http://schemas.openxmlformats.org/officeDocument/2006/relationships" xmlns:p="http://schemas.openxmlformats.org/presentationml/2006/main">
+  <p:cSld>
+    <p:spTree>
+      <p:nvGrpSpPr>
+        <p:cNvPr id="1" name=""/>
+        <p:cNvGrpSpPr/>
+        <p:nvPr/>
+      </p:nvGrpSpPr>
+      <p:grpSpPr>
+        <a:xfrm>
+          <a:off x="0" y="0"/>
+          <a:ext cx="0" cy="0"/>
+          <a:chOff x="0" y="0"/>
+          <a:chExt cx="0" cy="0"/>
+        </a:xfrm>
+      </p:grpSpPr>
+      <p:pic>
+        <p:nvPicPr>
+          <p:cNvPr id="8" name="Picture 7">
+            <a:extLst>
+              <a:ext uri="{FF2B5EF4-FFF2-40B4-BE49-F238E27FC236}">
+                <a16:creationId xmlns:a16="http://schemas.microsoft.com/office/drawing/2014/main" id="{887A10ED-1605-36A0-0958-AD864D4D2626}"/>
+              </a:ext>
+            </a:extLst>
+          </p:cNvPr>
+          <p:cNvPicPr>
+            <a:picLocks noChangeAspect="1"/>
+          </p:cNvPicPr>
+          <p:nvPr/>
+        </p:nvPicPr>
+        <p:blipFill>
+          <a:blip r:embed="rId2"/>
+          <a:stretch>
+            <a:fillRect/>
+          </a:stretch>
+        </p:blipFill>
+        <p:spPr>
+          <a:xfrm>
+            <a:off x="1108759" y="1579418"/>
+            <a:ext cx="9974482" cy="4131252"/>
+          </a:xfrm>
+          <a:prstGeom prst="rect">
+            <a:avLst/>
+          </a:prstGeom>
+        </p:spPr>
+      </p:pic>
+    </p:spTree>
+    <p:extLst>
+      <p:ext uri="{BB962C8B-B14F-4D97-AF65-F5344CB8AC3E}">
+        <p14:creationId xmlns:p14="http://schemas.microsoft.com/office/powerpoint/2010/main" val="2886869529"/>
+      </p:ext>
+    </p:extLst>
+  </p:cSld>
+  <p:clrMapOvr>
+    <a:masterClrMapping/>
+  </p:clrMapOvr>
+</p:sld>
+</file>
+
+<file path=ppt/slides/slide18.xml><?xml version="1.0" encoding="utf-8"?>
+<p:sld xmlns:a="http://schemas.openxmlformats.org/drawingml/2006/main" xmlns:r="http://schemas.openxmlformats.org/officeDocument/2006/relationships" xmlns:p="http://schemas.openxmlformats.org/presentationml/2006/main">
+  <p:cSld>
+    <p:spTree>
+      <p:nvGrpSpPr>
+        <p:cNvPr id="1" name=""/>
+        <p:cNvGrpSpPr/>
+        <p:nvPr/>
+      </p:nvGrpSpPr>
+      <p:grpSpPr>
+        <a:xfrm>
+          <a:off x="0" y="0"/>
+          <a:ext cx="0" cy="0"/>
+          <a:chOff x="0" y="0"/>
+          <a:chExt cx="0" cy="0"/>
+        </a:xfrm>
+      </p:grpSpPr>
+      <p:pic>
+        <p:nvPicPr>
+          <p:cNvPr id="5" name="Picture 4">
+            <a:extLst>
+              <a:ext uri="{FF2B5EF4-FFF2-40B4-BE49-F238E27FC236}">
+                <a16:creationId xmlns:a16="http://schemas.microsoft.com/office/drawing/2014/main" id="{73A0446B-4FA2-AB90-30F1-5661584EF504}"/>
+              </a:ext>
+            </a:extLst>
+          </p:cNvPr>
+          <p:cNvPicPr>
+            <a:picLocks noChangeAspect="1"/>
+          </p:cNvPicPr>
+          <p:nvPr/>
+        </p:nvPicPr>
+        <p:blipFill>
+          <a:blip r:embed="rId2"/>
+          <a:stretch>
+            <a:fillRect/>
+          </a:stretch>
+        </p:blipFill>
+        <p:spPr>
+          <a:xfrm>
+            <a:off x="1007969" y="1579417"/>
+            <a:ext cx="10176062" cy="4242089"/>
+          </a:xfrm>
+          <a:prstGeom prst="rect">
+            <a:avLst/>
+          </a:prstGeom>
+        </p:spPr>
+      </p:pic>
+    </p:spTree>
+    <p:extLst>
+      <p:ext uri="{BB962C8B-B14F-4D97-AF65-F5344CB8AC3E}">
+        <p14:creationId xmlns:p14="http://schemas.microsoft.com/office/powerpoint/2010/main" val="2969038079"/>
+      </p:ext>
+    </p:extLst>
+  </p:cSld>
+  <p:clrMapOvr>
+    <a:masterClrMapping/>
+  </p:clrMapOvr>
+</p:sld>
+</file>
+
+<file path=ppt/slides/slide19.xml><?xml version="1.0" encoding="utf-8"?>
+<p:sld xmlns:a="http://schemas.openxmlformats.org/drawingml/2006/main" xmlns:r="http://schemas.openxmlformats.org/officeDocument/2006/relationships" xmlns:p="http://schemas.openxmlformats.org/presentationml/2006/main">
+  <p:cSld>
+    <p:spTree>
+      <p:nvGrpSpPr>
+        <p:cNvPr id="1" name=""/>
+        <p:cNvGrpSpPr/>
+        <p:nvPr/>
+      </p:nvGrpSpPr>
+      <p:grpSpPr>
+        <a:xfrm>
+          <a:off x="0" y="0"/>
+          <a:ext cx="0" cy="0"/>
+          <a:chOff x="0" y="0"/>
+          <a:chExt cx="0" cy="0"/>
+        </a:xfrm>
+      </p:grpSpPr>
+      <p:pic>
+        <p:nvPicPr>
+          <p:cNvPr id="5" name="Picture 4">
+            <a:extLst>
+              <a:ext uri="{FF2B5EF4-FFF2-40B4-BE49-F238E27FC236}">
+                <a16:creationId xmlns:a16="http://schemas.microsoft.com/office/drawing/2014/main" id="{10E51C2B-DAE0-7D83-4586-70467B6F6726}"/>
+              </a:ext>
+            </a:extLst>
+          </p:cNvPr>
+          <p:cNvPicPr>
+            <a:picLocks noChangeAspect="1"/>
+          </p:cNvPicPr>
+          <p:nvPr/>
+        </p:nvPicPr>
+        <p:blipFill>
+          <a:blip r:embed="rId2"/>
+          <a:stretch>
+            <a:fillRect/>
+          </a:stretch>
+        </p:blipFill>
+        <p:spPr>
+          <a:xfrm>
+            <a:off x="2071687" y="1176337"/>
+            <a:ext cx="8048625" cy="4505325"/>
+          </a:xfrm>
+          <a:prstGeom prst="rect">
+            <a:avLst/>
+          </a:prstGeom>
+        </p:spPr>
+      </p:pic>
+    </p:spTree>
+    <p:extLst>
+      <p:ext uri="{BB962C8B-B14F-4D97-AF65-F5344CB8AC3E}">
+        <p14:creationId xmlns:p14="http://schemas.microsoft.com/office/powerpoint/2010/main" val="3109579215"/>
       </p:ext>
     </p:extLst>
   </p:cSld>
@@ -6281,6 +7846,454 @@
     <p:extLst>
       <p:ext uri="{BB962C8B-B14F-4D97-AF65-F5344CB8AC3E}">
         <p14:creationId xmlns:p14="http://schemas.microsoft.com/office/powerpoint/2010/main" val="1305278635"/>
+      </p:ext>
+    </p:extLst>
+  </p:cSld>
+  <p:clrMapOvr>
+    <a:masterClrMapping/>
+  </p:clrMapOvr>
+</p:sld>
+</file>
+
+<file path=ppt/slides/slide20.xml><?xml version="1.0" encoding="utf-8"?>
+<p:sld xmlns:a="http://schemas.openxmlformats.org/drawingml/2006/main" xmlns:r="http://schemas.openxmlformats.org/officeDocument/2006/relationships" xmlns:p="http://schemas.openxmlformats.org/presentationml/2006/main">
+  <p:cSld>
+    <p:spTree>
+      <p:nvGrpSpPr>
+        <p:cNvPr id="1" name=""/>
+        <p:cNvGrpSpPr/>
+        <p:nvPr/>
+      </p:nvGrpSpPr>
+      <p:grpSpPr>
+        <a:xfrm>
+          <a:off x="0" y="0"/>
+          <a:ext cx="0" cy="0"/>
+          <a:chOff x="0" y="0"/>
+          <a:chExt cx="0" cy="0"/>
+        </a:xfrm>
+      </p:grpSpPr>
+      <p:pic>
+        <p:nvPicPr>
+          <p:cNvPr id="4" name="Picture 3">
+            <a:extLst>
+              <a:ext uri="{FF2B5EF4-FFF2-40B4-BE49-F238E27FC236}">
+                <a16:creationId xmlns:a16="http://schemas.microsoft.com/office/drawing/2014/main" id="{25FDA645-37CF-96DD-49F4-EF3881969D6C}"/>
+              </a:ext>
+            </a:extLst>
+          </p:cNvPr>
+          <p:cNvPicPr>
+            <a:picLocks noChangeAspect="1"/>
+          </p:cNvPicPr>
+          <p:nvPr/>
+        </p:nvPicPr>
+        <p:blipFill>
+          <a:blip r:embed="rId2"/>
+          <a:stretch>
+            <a:fillRect/>
+          </a:stretch>
+        </p:blipFill>
+        <p:spPr>
+          <a:xfrm>
+            <a:off x="2071687" y="1176337"/>
+            <a:ext cx="8048625" cy="4505325"/>
+          </a:xfrm>
+          <a:prstGeom prst="rect">
+            <a:avLst/>
+          </a:prstGeom>
+        </p:spPr>
+      </p:pic>
+    </p:spTree>
+    <p:extLst>
+      <p:ext uri="{BB962C8B-B14F-4D97-AF65-F5344CB8AC3E}">
+        <p14:creationId xmlns:p14="http://schemas.microsoft.com/office/powerpoint/2010/main" val="4142997562"/>
+      </p:ext>
+    </p:extLst>
+  </p:cSld>
+  <p:clrMapOvr>
+    <a:masterClrMapping/>
+  </p:clrMapOvr>
+</p:sld>
+</file>
+
+<file path=ppt/slides/slide21.xml><?xml version="1.0" encoding="utf-8"?>
+<p:sld xmlns:a="http://schemas.openxmlformats.org/drawingml/2006/main" xmlns:r="http://schemas.openxmlformats.org/officeDocument/2006/relationships" xmlns:p="http://schemas.openxmlformats.org/presentationml/2006/main">
+  <p:cSld>
+    <p:spTree>
+      <p:nvGrpSpPr>
+        <p:cNvPr id="1" name=""/>
+        <p:cNvGrpSpPr/>
+        <p:nvPr/>
+      </p:nvGrpSpPr>
+      <p:grpSpPr>
+        <a:xfrm>
+          <a:off x="0" y="0"/>
+          <a:ext cx="0" cy="0"/>
+          <a:chOff x="0" y="0"/>
+          <a:chExt cx="0" cy="0"/>
+        </a:xfrm>
+      </p:grpSpPr>
+      <p:pic>
+        <p:nvPicPr>
+          <p:cNvPr id="6" name="Picture 5">
+            <a:extLst>
+              <a:ext uri="{FF2B5EF4-FFF2-40B4-BE49-F238E27FC236}">
+                <a16:creationId xmlns:a16="http://schemas.microsoft.com/office/drawing/2014/main" id="{6B2E8DA6-1B70-74E8-C333-C91743A31DC9}"/>
+              </a:ext>
+            </a:extLst>
+          </p:cNvPr>
+          <p:cNvPicPr>
+            <a:picLocks noChangeAspect="1"/>
+          </p:cNvPicPr>
+          <p:nvPr/>
+        </p:nvPicPr>
+        <p:blipFill>
+          <a:blip r:embed="rId2"/>
+          <a:stretch>
+            <a:fillRect/>
+          </a:stretch>
+        </p:blipFill>
+        <p:spPr>
+          <a:xfrm>
+            <a:off x="2166937" y="1371600"/>
+            <a:ext cx="7858125" cy="4114800"/>
+          </a:xfrm>
+          <a:prstGeom prst="rect">
+            <a:avLst/>
+          </a:prstGeom>
+        </p:spPr>
+      </p:pic>
+    </p:spTree>
+    <p:extLst>
+      <p:ext uri="{BB962C8B-B14F-4D97-AF65-F5344CB8AC3E}">
+        <p14:creationId xmlns:p14="http://schemas.microsoft.com/office/powerpoint/2010/main" val="4223601982"/>
+      </p:ext>
+    </p:extLst>
+  </p:cSld>
+  <p:clrMapOvr>
+    <a:masterClrMapping/>
+  </p:clrMapOvr>
+</p:sld>
+</file>
+
+<file path=ppt/slides/slide22.xml><?xml version="1.0" encoding="utf-8"?>
+<p:sld xmlns:a="http://schemas.openxmlformats.org/drawingml/2006/main" xmlns:r="http://schemas.openxmlformats.org/officeDocument/2006/relationships" xmlns:p="http://schemas.openxmlformats.org/presentationml/2006/main">
+  <p:cSld>
+    <p:spTree>
+      <p:nvGrpSpPr>
+        <p:cNvPr id="1" name=""/>
+        <p:cNvGrpSpPr/>
+        <p:nvPr/>
+      </p:nvGrpSpPr>
+      <p:grpSpPr>
+        <a:xfrm>
+          <a:off x="0" y="0"/>
+          <a:ext cx="0" cy="0"/>
+          <a:chOff x="0" y="0"/>
+          <a:chExt cx="0" cy="0"/>
+        </a:xfrm>
+      </p:grpSpPr>
+      <p:pic>
+        <p:nvPicPr>
+          <p:cNvPr id="3" name="Picture 2">
+            <a:extLst>
+              <a:ext uri="{FF2B5EF4-FFF2-40B4-BE49-F238E27FC236}">
+                <a16:creationId xmlns:a16="http://schemas.microsoft.com/office/drawing/2014/main" id="{27AC3E32-0615-3755-10C5-869C63233E1E}"/>
+              </a:ext>
+            </a:extLst>
+          </p:cNvPr>
+          <p:cNvPicPr>
+            <a:picLocks noChangeAspect="1"/>
+          </p:cNvPicPr>
+          <p:nvPr/>
+        </p:nvPicPr>
+        <p:blipFill>
+          <a:blip r:embed="rId2"/>
+          <a:stretch>
+            <a:fillRect/>
+          </a:stretch>
+        </p:blipFill>
+        <p:spPr>
+          <a:xfrm>
+            <a:off x="2166937" y="1276350"/>
+            <a:ext cx="7858125" cy="4305300"/>
+          </a:xfrm>
+          <a:prstGeom prst="rect">
+            <a:avLst/>
+          </a:prstGeom>
+        </p:spPr>
+      </p:pic>
+    </p:spTree>
+    <p:extLst>
+      <p:ext uri="{BB962C8B-B14F-4D97-AF65-F5344CB8AC3E}">
+        <p14:creationId xmlns:p14="http://schemas.microsoft.com/office/powerpoint/2010/main" val="2508219047"/>
+      </p:ext>
+    </p:extLst>
+  </p:cSld>
+  <p:clrMapOvr>
+    <a:masterClrMapping/>
+  </p:clrMapOvr>
+</p:sld>
+</file>
+
+<file path=ppt/slides/slide23.xml><?xml version="1.0" encoding="utf-8"?>
+<p:sld xmlns:a="http://schemas.openxmlformats.org/drawingml/2006/main" xmlns:r="http://schemas.openxmlformats.org/officeDocument/2006/relationships" xmlns:p="http://schemas.openxmlformats.org/presentationml/2006/main">
+  <p:cSld>
+    <p:spTree>
+      <p:nvGrpSpPr>
+        <p:cNvPr id="1" name=""/>
+        <p:cNvGrpSpPr/>
+        <p:nvPr/>
+      </p:nvGrpSpPr>
+      <p:grpSpPr>
+        <a:xfrm>
+          <a:off x="0" y="0"/>
+          <a:ext cx="0" cy="0"/>
+          <a:chOff x="0" y="0"/>
+          <a:chExt cx="0" cy="0"/>
+        </a:xfrm>
+      </p:grpSpPr>
+      <p:sp>
+        <p:nvSpPr>
+          <p:cNvPr id="3" name="Content Placeholder 2">
+            <a:extLst>
+              <a:ext uri="{FF2B5EF4-FFF2-40B4-BE49-F238E27FC236}">
+                <a16:creationId xmlns:a16="http://schemas.microsoft.com/office/drawing/2014/main" id="{F52D78B5-F45F-9C0A-0C97-7CBE40AC76E9}"/>
+              </a:ext>
+            </a:extLst>
+          </p:cNvPr>
+          <p:cNvSpPr>
+            <a:spLocks noGrp="1"/>
+          </p:cNvSpPr>
+          <p:nvPr>
+            <p:ph idx="1"/>
+          </p:nvPr>
+        </p:nvSpPr>
+        <p:spPr>
+          <a:xfrm>
+            <a:off x="723900" y="289560"/>
+            <a:ext cx="10629900" cy="5887403"/>
+          </a:xfrm>
+        </p:spPr>
+        <p:txBody>
+          <a:bodyPr>
+            <a:normAutofit/>
+          </a:bodyPr>
+          <a:lstStyle/>
+          <a:p>
+            <a:pPr marL="0" indent="0">
+              <a:buNone/>
+            </a:pPr>
+            <a:r>
+              <a:rPr lang="en-GB" sz="1500" b="1" dirty="0"/>
+              <a:t>RFM Analysis</a:t>
+            </a:r>
+          </a:p>
+          <a:p>
+            <a:r>
+              <a:rPr lang="en-GB" sz="1500" dirty="0"/>
+              <a:t>Clustering RFM scores was unable to infer in differences per category spend amongst the accounts available </a:t>
+            </a:r>
+            <a:r>
+              <a:rPr lang="en-GB" sz="1500" dirty="0">
+                <a:sym typeface="Wingdings" panose="05000000000000000000" pitchFamily="2" charset="2"/>
+              </a:rPr>
+              <a:t> Need another approach to be able to understand consumer behaviour in order to create targeted approaches.</a:t>
+            </a:r>
+          </a:p>
+          <a:p>
+            <a:endParaRPr lang="en-GB" sz="1500" dirty="0">
+              <a:sym typeface="Wingdings" panose="05000000000000000000" pitchFamily="2" charset="2"/>
+            </a:endParaRPr>
+          </a:p>
+          <a:p>
+            <a:endParaRPr lang="en-GB" sz="1500" dirty="0">
+              <a:sym typeface="Wingdings" panose="05000000000000000000" pitchFamily="2" charset="2"/>
+            </a:endParaRPr>
+          </a:p>
+          <a:p>
+            <a:pPr marL="0" indent="0">
+              <a:buNone/>
+            </a:pPr>
+            <a:r>
+              <a:rPr lang="en-GB" sz="1500" b="1">
+                <a:sym typeface="Wingdings" panose="05000000000000000000" pitchFamily="2" charset="2"/>
+              </a:rPr>
+              <a:t>Marketing Recommendations</a:t>
+            </a:r>
+            <a:endParaRPr lang="en-GB" sz="1500" b="1" dirty="0">
+              <a:sym typeface="Wingdings" panose="05000000000000000000" pitchFamily="2" charset="2"/>
+            </a:endParaRPr>
+          </a:p>
+          <a:p>
+            <a:r>
+              <a:rPr lang="en-GB" sz="1500" dirty="0"/>
+              <a:t>Lots of young working people get credit cards to improve their to get PCP finance or mortgages.</a:t>
+            </a:r>
+          </a:p>
+          <a:p>
+            <a:r>
+              <a:rPr lang="en-GB" sz="1500" dirty="0"/>
+              <a:t>Can tailor Lloyd’s bank credit card offering with specific cashback schemes aimed cafes/fast food restaurants etc during the week.</a:t>
+            </a:r>
+          </a:p>
+          <a:p>
+            <a:endParaRPr lang="en-GB" sz="1500" dirty="0"/>
+          </a:p>
+        </p:txBody>
+      </p:sp>
+    </p:spTree>
+    <p:extLst>
+      <p:ext uri="{BB962C8B-B14F-4D97-AF65-F5344CB8AC3E}">
+        <p14:creationId xmlns:p14="http://schemas.microsoft.com/office/powerpoint/2010/main" val="2057351055"/>
+      </p:ext>
+    </p:extLst>
+  </p:cSld>
+  <p:clrMapOvr>
+    <a:masterClrMapping/>
+  </p:clrMapOvr>
+</p:sld>
+</file>
+
+<file path=ppt/slides/slide24.xml><?xml version="1.0" encoding="utf-8"?>
+<p:sld xmlns:a="http://schemas.openxmlformats.org/drawingml/2006/main" xmlns:r="http://schemas.openxmlformats.org/officeDocument/2006/relationships" xmlns:p="http://schemas.openxmlformats.org/presentationml/2006/main">
+  <p:cSld>
+    <p:spTree>
+      <p:nvGrpSpPr>
+        <p:cNvPr id="1" name=""/>
+        <p:cNvGrpSpPr/>
+        <p:nvPr/>
+      </p:nvGrpSpPr>
+      <p:grpSpPr>
+        <a:xfrm>
+          <a:off x="0" y="0"/>
+          <a:ext cx="0" cy="0"/>
+          <a:chOff x="0" y="0"/>
+          <a:chExt cx="0" cy="0"/>
+        </a:xfrm>
+      </p:grpSpPr>
+      <p:sp>
+        <p:nvSpPr>
+          <p:cNvPr id="3" name="Content Placeholder 2">
+            <a:extLst>
+              <a:ext uri="{FF2B5EF4-FFF2-40B4-BE49-F238E27FC236}">
+                <a16:creationId xmlns:a16="http://schemas.microsoft.com/office/drawing/2014/main" id="{F52D78B5-F45F-9C0A-0C97-7CBE40AC76E9}"/>
+              </a:ext>
+            </a:extLst>
+          </p:cNvPr>
+          <p:cNvSpPr>
+            <a:spLocks noGrp="1"/>
+          </p:cNvSpPr>
+          <p:nvPr>
+            <p:ph idx="1"/>
+          </p:nvPr>
+        </p:nvSpPr>
+        <p:spPr>
+          <a:xfrm>
+            <a:off x="723900" y="289560"/>
+            <a:ext cx="10629900" cy="5887403"/>
+          </a:xfrm>
+        </p:spPr>
+        <p:txBody>
+          <a:bodyPr>
+            <a:normAutofit/>
+          </a:bodyPr>
+          <a:lstStyle/>
+          <a:p>
+            <a:pPr marL="0" indent="0">
+              <a:buNone/>
+            </a:pPr>
+            <a:r>
+              <a:rPr lang="en-GB" sz="2000" u="sng" dirty="0"/>
+              <a:t>Potential issues with this approach</a:t>
+            </a:r>
+          </a:p>
+          <a:p>
+            <a:pPr marL="0" indent="0">
+              <a:buNone/>
+            </a:pPr>
+            <a:endParaRPr lang="en-GB" sz="2000" u="sng" dirty="0"/>
+          </a:p>
+          <a:p>
+            <a:pPr marL="0" indent="0">
+              <a:buNone/>
+            </a:pPr>
+            <a:r>
+              <a:rPr lang="en-GB" sz="1500" b="1" dirty="0"/>
+              <a:t>K-Means</a:t>
+            </a:r>
+          </a:p>
+          <a:p>
+            <a:r>
+              <a:rPr lang="en-GB" sz="1500" dirty="0"/>
+              <a:t>Heavily dependant on random initialisation of centroids in order to converge to an optimal solution – </a:t>
+            </a:r>
+            <a:r>
+              <a:rPr lang="en-GB" sz="1500" i="1" dirty="0"/>
+              <a:t>k-means++ algorithm</a:t>
+            </a:r>
+            <a:r>
+              <a:rPr lang="en-GB" sz="1500" dirty="0"/>
+              <a:t> solves this.</a:t>
+            </a:r>
+          </a:p>
+          <a:p>
+            <a:r>
+              <a:rPr lang="en-GB" sz="1500" dirty="0"/>
+              <a:t>Assumes clusters belong within a radial distance from a centroid – ‘spherical’ clusters.</a:t>
+            </a:r>
+          </a:p>
+          <a:p>
+            <a:r>
+              <a:rPr lang="en-GB" sz="1500" dirty="0"/>
+              <a:t>Ignores density of clusters. E.g. disparate clusters with a high densities of points may be drawn into a single cluster with a centroid between them.</a:t>
+            </a:r>
+          </a:p>
+          <a:p>
+            <a:r>
+              <a:rPr lang="en-GB" sz="1500" dirty="0"/>
+              <a:t>No mechanism for detecting outliers or uncertainties for points in overlapping clusters.</a:t>
+            </a:r>
+          </a:p>
+          <a:p>
+            <a:r>
+              <a:rPr lang="en-GB" sz="1500" dirty="0"/>
+              <a:t>Have to interpret the clusters numbers and almost manually select the number of clusters.</a:t>
+            </a:r>
+          </a:p>
+          <a:p>
+            <a:endParaRPr lang="en-GB" sz="1500" dirty="0"/>
+          </a:p>
+          <a:p>
+            <a:endParaRPr lang="en-GB" sz="1500" dirty="0"/>
+          </a:p>
+          <a:p>
+            <a:pPr marL="0" indent="0">
+              <a:buNone/>
+            </a:pPr>
+            <a:r>
+              <a:rPr lang="en-GB" sz="1500" b="1" dirty="0"/>
+              <a:t>RFM Analysis</a:t>
+            </a:r>
+          </a:p>
+          <a:p>
+            <a:r>
+              <a:rPr lang="en-GB" sz="1500" dirty="0"/>
+              <a:t>Clustering RFM scores was unable to infer in differences per category spend amongst the accounts available </a:t>
+            </a:r>
+            <a:r>
+              <a:rPr lang="en-GB" sz="1500" dirty="0">
+                <a:sym typeface="Wingdings" panose="05000000000000000000" pitchFamily="2" charset="2"/>
+              </a:rPr>
+              <a:t> Need another approach to be able to understand consumer behaviour in order to create targeted approaches.</a:t>
+            </a:r>
+            <a:endParaRPr lang="en-GB" sz="1500" dirty="0"/>
+          </a:p>
+        </p:txBody>
+      </p:sp>
+    </p:spTree>
+    <p:extLst>
+      <p:ext uri="{BB962C8B-B14F-4D97-AF65-F5344CB8AC3E}">
+        <p14:creationId xmlns:p14="http://schemas.microsoft.com/office/powerpoint/2010/main" val="4199166108"/>
       </p:ext>
     </p:extLst>
   </p:cSld>
@@ -7756,6 +9769,23 @@
 </file>
 
 <file path=customXml/item1.xml><?xml version="1.0" encoding="utf-8"?>
+<p:properties xmlns:p="http://schemas.microsoft.com/office/2006/metadata/properties" xmlns:xsi="http://www.w3.org/2001/XMLSchema-instance" xmlns:pc="http://schemas.microsoft.com/office/infopath/2007/PartnerControls">
+  <documentManagement>
+    <_activity xmlns="d727c9a1-4cc8-4dae-b26f-3016540a6122" xsi:nil="true"/>
+  </documentManagement>
+</p:properties>
+</file>
+
+<file path=customXml/item2.xml><?xml version="1.0" encoding="utf-8"?>
+<?mso-contentType ?>
+<FormTemplates xmlns="http://schemas.microsoft.com/sharepoint/v3/contenttype/forms">
+  <Display>DocumentLibraryForm</Display>
+  <Edit>DocumentLibraryForm</Edit>
+  <New>DocumentLibraryForm</New>
+</FormTemplates>
+</file>
+
+<file path=customXml/item3.xml><?xml version="1.0" encoding="utf-8"?>
 <ct:contentTypeSchema xmlns:ct="http://schemas.microsoft.com/office/2006/metadata/contentType" xmlns:ma="http://schemas.microsoft.com/office/2006/metadata/properties/metaAttributes" ct:_="" ma:_="" ma:contentTypeName="Document" ma:contentTypeID="0x01010029DDE852DE9DAB4A97E6F8A357786F31" ma:contentTypeVersion="16" ma:contentTypeDescription="Create a new document." ma:contentTypeScope="" ma:versionID="edbe17029275bc321119e343b4a1c8ce">
   <xsd:schema xmlns:xsd="http://www.w3.org/2001/XMLSchema" xmlns:xs="http://www.w3.org/2001/XMLSchema" xmlns:p="http://schemas.microsoft.com/office/2006/metadata/properties" xmlns:ns3="d727c9a1-4cc8-4dae-b26f-3016540a6122" xmlns:ns4="4843f6d6-50bc-4979-bebb-2e9e902adf18" targetNamespace="http://schemas.microsoft.com/office/2006/metadata/properties" ma:root="true" ma:fieldsID="e65c90bde7c6b9821291a0ba3a2a0498" ns3:_="" ns4:_="">
     <xsd:import namespace="d727c9a1-4cc8-4dae-b26f-3016540a6122"/>
@@ -7996,24 +10026,32 @@
 </ct:contentTypeSchema>
 </file>
 
-<file path=customXml/item2.xml><?xml version="1.0" encoding="utf-8"?>
-<?mso-contentType ?>
-<FormTemplates xmlns="http://schemas.microsoft.com/sharepoint/v3/contenttype/forms">
-  <Display>DocumentLibraryForm</Display>
-  <Edit>DocumentLibraryForm</Edit>
-  <New>DocumentLibraryForm</New>
-</FormTemplates>
+<file path=customXml/itemProps1.xml><?xml version="1.0" encoding="utf-8"?>
+<ds:datastoreItem xmlns:ds="http://schemas.openxmlformats.org/officeDocument/2006/customXml" ds:itemID="{B5DE8817-F03C-49C7-8044-3B3F3F2BC66E}">
+  <ds:schemaRefs>
+    <ds:schemaRef ds:uri="d727c9a1-4cc8-4dae-b26f-3016540a6122"/>
+    <ds:schemaRef ds:uri="http://purl.org/dc/dcmitype/"/>
+    <ds:schemaRef ds:uri="http://purl.org/dc/elements/1.1/"/>
+    <ds:schemaRef ds:uri="http://schemas.microsoft.com/office/2006/metadata/properties"/>
+    <ds:schemaRef ds:uri="http://purl.org/dc/terms/"/>
+    <ds:schemaRef ds:uri="http://schemas.microsoft.com/office/2006/documentManagement/types"/>
+    <ds:schemaRef ds:uri="http://schemas.microsoft.com/office/infopath/2007/PartnerControls"/>
+    <ds:schemaRef ds:uri="http://schemas.openxmlformats.org/package/2006/metadata/core-properties"/>
+    <ds:schemaRef ds:uri="4843f6d6-50bc-4979-bebb-2e9e902adf18"/>
+    <ds:schemaRef ds:uri="http://www.w3.org/XML/1998/namespace"/>
+  </ds:schemaRefs>
+</ds:datastoreItem>
 </file>
 
-<file path=customXml/item3.xml><?xml version="1.0" encoding="utf-8"?>
-<p:properties xmlns:p="http://schemas.microsoft.com/office/2006/metadata/properties" xmlns:xsi="http://www.w3.org/2001/XMLSchema-instance" xmlns:pc="http://schemas.microsoft.com/office/infopath/2007/PartnerControls">
-  <documentManagement>
-    <_activity xmlns="d727c9a1-4cc8-4dae-b26f-3016540a6122" xsi:nil="true"/>
-  </documentManagement>
-</p:properties>
+<file path=customXml/itemProps2.xml><?xml version="1.0" encoding="utf-8"?>
+<ds:datastoreItem xmlns:ds="http://schemas.openxmlformats.org/officeDocument/2006/customXml" ds:itemID="{43285F8E-73FA-4723-92C7-3AC049FD41DE}">
+  <ds:schemaRefs>
+    <ds:schemaRef ds:uri="http://schemas.microsoft.com/sharepoint/v3/contenttype/forms"/>
+  </ds:schemaRefs>
+</ds:datastoreItem>
 </file>
 
-<file path=customXml/itemProps1.xml><?xml version="1.0" encoding="utf-8"?>
+<file path=customXml/itemProps3.xml><?xml version="1.0" encoding="utf-8"?>
 <ds:datastoreItem xmlns:ds="http://schemas.openxmlformats.org/officeDocument/2006/customXml" ds:itemID="{77F9B306-1F2F-4886-A740-26896DD4F80E}">
   <ds:schemaRefs>
     <ds:schemaRef ds:uri="http://schemas.microsoft.com/office/2006/metadata/contentType"/>
@@ -8030,29 +10068,4 @@
     <ds:schemaRef ds:uri="http://schemas.microsoft.com/internal/obd"/>
   </ds:schemaRefs>
 </ds:datastoreItem>
-</file>
-
-<file path=customXml/itemProps2.xml><?xml version="1.0" encoding="utf-8"?>
-<ds:datastoreItem xmlns:ds="http://schemas.openxmlformats.org/officeDocument/2006/customXml" ds:itemID="{43285F8E-73FA-4723-92C7-3AC049FD41DE}">
-  <ds:schemaRefs>
-    <ds:schemaRef ds:uri="http://schemas.microsoft.com/sharepoint/v3/contenttype/forms"/>
-  </ds:schemaRefs>
-</ds:datastoreItem>
-</file>
-
-<file path=customXml/itemProps3.xml><?xml version="1.0" encoding="utf-8"?>
-<ds:datastoreItem xmlns:ds="http://schemas.openxmlformats.org/officeDocument/2006/customXml" ds:itemID="{B5DE8817-F03C-49C7-8044-3B3F3F2BC66E}">
-  <ds:schemaRefs>
-    <ds:schemaRef ds:uri="d727c9a1-4cc8-4dae-b26f-3016540a6122"/>
-    <ds:schemaRef ds:uri="http://purl.org/dc/dcmitype/"/>
-    <ds:schemaRef ds:uri="http://purl.org/dc/elements/1.1/"/>
-    <ds:schemaRef ds:uri="http://schemas.microsoft.com/office/2006/metadata/properties"/>
-    <ds:schemaRef ds:uri="http://purl.org/dc/terms/"/>
-    <ds:schemaRef ds:uri="http://schemas.microsoft.com/office/2006/documentManagement/types"/>
-    <ds:schemaRef ds:uri="http://schemas.microsoft.com/office/infopath/2007/PartnerControls"/>
-    <ds:schemaRef ds:uri="http://schemas.openxmlformats.org/package/2006/metadata/core-properties"/>
-    <ds:schemaRef ds:uri="4843f6d6-50bc-4979-bebb-2e9e902adf18"/>
-    <ds:schemaRef ds:uri="http://www.w3.org/XML/1998/namespace"/>
-  </ds:schemaRefs>
-</ds:datastoreItem>
 </file>
</xml_diff>